<commit_message>
Added DFS Tree and Time Stamp Illustrations
</commit_message>
<xml_diff>
--- a/Illustrations/illustrations.pptx
+++ b/Illustrations/illustrations.pptx
@@ -8913,7 +8913,10 @@
             </a:prstGeom>
             <a:ln w="76200">
               <a:solidFill>
-                <a:schemeClr val="accent6"/>
+                <a:schemeClr val="tx1">
+                  <a:lumMod val="50000"/>
+                  <a:lumOff val="50000"/>
+                </a:schemeClr>
               </a:solidFill>
             </a:ln>
           </p:spPr>
@@ -8986,7 +8989,10 @@
             </a:prstGeom>
             <a:ln w="76200">
               <a:solidFill>
-                <a:schemeClr val="accent6"/>
+                <a:schemeClr val="tx1">
+                  <a:lumMod val="50000"/>
+                  <a:lumOff val="50000"/>
+                </a:schemeClr>
               </a:solidFill>
             </a:ln>
           </p:spPr>
@@ -9021,7 +9027,10 @@
             </a:prstGeom>
             <a:ln w="76200">
               <a:solidFill>
-                <a:schemeClr val="accent6"/>
+                <a:schemeClr val="tx1">
+                  <a:lumMod val="50000"/>
+                  <a:lumOff val="50000"/>
+                </a:schemeClr>
               </a:solidFill>
             </a:ln>
           </p:spPr>
@@ -9056,7 +9065,10 @@
             </a:prstGeom>
             <a:ln w="76200">
               <a:solidFill>
-                <a:schemeClr val="accent6"/>
+                <a:schemeClr val="tx1">
+                  <a:lumMod val="50000"/>
+                  <a:lumOff val="50000"/>
+                </a:schemeClr>
               </a:solidFill>
             </a:ln>
           </p:spPr>
@@ -9091,7 +9103,10 @@
             </a:prstGeom>
             <a:ln w="76200">
               <a:solidFill>
-                <a:schemeClr val="accent6"/>
+                <a:schemeClr val="tx1">
+                  <a:lumMod val="50000"/>
+                  <a:lumOff val="50000"/>
+                </a:schemeClr>
               </a:solidFill>
             </a:ln>
           </p:spPr>
@@ -9164,7 +9179,10 @@
             </a:prstGeom>
             <a:ln w="76200">
               <a:solidFill>
-                <a:schemeClr val="accent6"/>
+                <a:schemeClr val="tx1">
+                  <a:lumMod val="50000"/>
+                  <a:lumOff val="50000"/>
+                </a:schemeClr>
               </a:solidFill>
             </a:ln>
           </p:spPr>
@@ -9199,7 +9217,10 @@
             </a:prstGeom>
             <a:ln w="76200">
               <a:solidFill>
-                <a:schemeClr val="accent6"/>
+                <a:schemeClr val="tx1">
+                  <a:lumMod val="50000"/>
+                  <a:lumOff val="50000"/>
+                </a:schemeClr>
               </a:solidFill>
             </a:ln>
           </p:spPr>
@@ -9234,7 +9255,10 @@
             </a:prstGeom>
             <a:ln w="76200">
               <a:solidFill>
-                <a:schemeClr val="accent6"/>
+                <a:schemeClr val="tx1">
+                  <a:lumMod val="50000"/>
+                  <a:lumOff val="50000"/>
+                </a:schemeClr>
               </a:solidFill>
             </a:ln>
           </p:spPr>
@@ -9307,7 +9331,10 @@
             </a:prstGeom>
             <a:ln w="76200">
               <a:solidFill>
-                <a:schemeClr val="accent6"/>
+                <a:schemeClr val="tx1">
+                  <a:lumMod val="50000"/>
+                  <a:lumOff val="50000"/>
+                </a:schemeClr>
               </a:solidFill>
             </a:ln>
           </p:spPr>
@@ -10352,9 +10379,9 @@
             <p:nvPr/>
           </p:nvCxnSpPr>
           <p:spPr>
-            <a:xfrm flipH="1">
-              <a:off x="9353223" y="4331258"/>
-              <a:ext cx="547270" cy="976423"/>
+            <a:xfrm>
+              <a:off x="8861237" y="4324078"/>
+              <a:ext cx="491986" cy="983603"/>
             </a:xfrm>
             <a:prstGeom prst="line">
               <a:avLst/>
@@ -11054,528 +11081,1159 @@
       </p:grpSpPr>
       <p:grpSp>
         <p:nvGrpSpPr>
-          <p:cNvPr id="113" name="群組 112"/>
+          <p:cNvPr id="7" name="群組 6"/>
           <p:cNvGrpSpPr/>
           <p:nvPr/>
         </p:nvGrpSpPr>
         <p:grpSpPr>
           <a:xfrm>
-            <a:off x="1338075" y="921181"/>
-            <a:ext cx="3890742" cy="4641758"/>
-            <a:chOff x="3625137" y="749311"/>
-            <a:chExt cx="3890742" cy="4641758"/>
+            <a:off x="3564467" y="1031247"/>
+            <a:ext cx="3840011" cy="5046751"/>
+            <a:chOff x="3564467" y="1031247"/>
+            <a:chExt cx="3840011" cy="5046751"/>
           </a:xfrm>
         </p:grpSpPr>
-        <p:cxnSp>
-          <p:nvCxnSpPr>
-            <p:cNvPr id="43" name="直線接點 42"/>
-            <p:cNvCxnSpPr/>
+        <p:grpSp>
+          <p:nvGrpSpPr>
+            <p:cNvPr id="115" name="群組 114"/>
+            <p:cNvGrpSpPr/>
             <p:nvPr/>
-          </p:nvCxnSpPr>
-          <p:spPr>
-            <a:xfrm flipV="1">
-              <a:off x="4657246" y="1023707"/>
-              <a:ext cx="858578" cy="888771"/>
+          </p:nvGrpSpPr>
+          <p:grpSpPr>
+            <a:xfrm>
+              <a:off x="3564467" y="1031247"/>
+              <a:ext cx="3828402" cy="5046751"/>
+              <a:chOff x="6784102" y="528480"/>
+              <a:chExt cx="3828402" cy="5046751"/>
             </a:xfrm>
-            <a:prstGeom prst="line">
-              <a:avLst/>
-            </a:prstGeom>
-            <a:ln w="76200">
+          </p:grpSpPr>
+          <p:sp>
+            <p:nvSpPr>
+              <p:cNvPr id="116" name="弧形 115"/>
+              <p:cNvSpPr/>
+              <p:nvPr/>
+            </p:nvSpPr>
+            <p:spPr>
+              <a:xfrm rot="21390419">
+                <a:off x="8369127" y="2521473"/>
+                <a:ext cx="2243377" cy="2676921"/>
+              </a:xfrm>
+              <a:prstGeom prst="arc">
+                <a:avLst>
+                  <a:gd name="adj1" fmla="val 15510603"/>
+                  <a:gd name="adj2" fmla="val 5394745"/>
+                </a:avLst>
+              </a:prstGeom>
+              <a:ln w="76200">
+                <a:solidFill>
+                  <a:schemeClr val="tx1">
+                    <a:lumMod val="50000"/>
+                    <a:lumOff val="50000"/>
+                  </a:schemeClr>
+                </a:solidFill>
+              </a:ln>
+            </p:spPr>
+            <p:style>
+              <a:lnRef idx="1">
+                <a:schemeClr val="accent1"/>
+              </a:lnRef>
+              <a:fillRef idx="0">
+                <a:schemeClr val="accent1"/>
+              </a:fillRef>
+              <a:effectRef idx="0">
+                <a:schemeClr val="accent1"/>
+              </a:effectRef>
+              <a:fontRef idx="minor">
+                <a:schemeClr val="tx1"/>
+              </a:fontRef>
+            </p:style>
+            <p:txBody>
+              <a:bodyPr rtlCol="0" anchor="ctr"/>
+              <a:lstStyle/>
+              <a:p>
+                <a:pPr algn="ctr"/>
+                <a:endParaRPr lang="zh-TW" altLang="en-US"/>
+              </a:p>
+            </p:txBody>
+          </p:sp>
+          <p:sp>
+            <p:nvSpPr>
+              <p:cNvPr id="117" name="弧形 116"/>
+              <p:cNvSpPr/>
+              <p:nvPr/>
+            </p:nvSpPr>
+            <p:spPr>
+              <a:xfrm rot="20858719">
+                <a:off x="8404937" y="2648245"/>
+                <a:ext cx="1737939" cy="2009695"/>
+              </a:xfrm>
+              <a:prstGeom prst="arc">
+                <a:avLst>
+                  <a:gd name="adj1" fmla="val 16489356"/>
+                  <a:gd name="adj2" fmla="val 3690667"/>
+                </a:avLst>
+              </a:prstGeom>
+              <a:ln w="76200">
+                <a:solidFill>
+                  <a:schemeClr val="tx1">
+                    <a:lumMod val="50000"/>
+                    <a:lumOff val="50000"/>
+                  </a:schemeClr>
+                </a:solidFill>
+              </a:ln>
+            </p:spPr>
+            <p:style>
+              <a:lnRef idx="1">
+                <a:schemeClr val="accent1"/>
+              </a:lnRef>
+              <a:fillRef idx="0">
+                <a:schemeClr val="accent1"/>
+              </a:fillRef>
+              <a:effectRef idx="0">
+                <a:schemeClr val="accent1"/>
+              </a:effectRef>
+              <a:fontRef idx="minor">
+                <a:schemeClr val="tx1"/>
+              </a:fontRef>
+            </p:style>
+            <p:txBody>
+              <a:bodyPr rtlCol="0" anchor="ctr"/>
+              <a:lstStyle/>
+              <a:p>
+                <a:pPr algn="ctr"/>
+                <a:endParaRPr lang="zh-TW" altLang="en-US"/>
+              </a:p>
+            </p:txBody>
+          </p:sp>
+          <p:sp>
+            <p:nvSpPr>
+              <p:cNvPr id="118" name="弧形 117"/>
+              <p:cNvSpPr/>
+              <p:nvPr/>
+            </p:nvSpPr>
+            <p:spPr>
+              <a:xfrm flipH="1">
+                <a:off x="6784102" y="886557"/>
+                <a:ext cx="2580542" cy="2463886"/>
+              </a:xfrm>
+              <a:prstGeom prst="arc">
+                <a:avLst>
+                  <a:gd name="adj1" fmla="val 16280781"/>
+                  <a:gd name="adj2" fmla="val 5328389"/>
+                </a:avLst>
+              </a:prstGeom>
+              <a:ln w="76200">
+                <a:solidFill>
+                  <a:schemeClr val="tx1">
+                    <a:lumMod val="50000"/>
+                    <a:lumOff val="50000"/>
+                  </a:schemeClr>
+                </a:solidFill>
+              </a:ln>
+            </p:spPr>
+            <p:style>
+              <a:lnRef idx="1">
+                <a:schemeClr val="accent1"/>
+              </a:lnRef>
+              <a:fillRef idx="0">
+                <a:schemeClr val="accent1"/>
+              </a:fillRef>
+              <a:effectRef idx="0">
+                <a:schemeClr val="accent1"/>
+              </a:effectRef>
+              <a:fontRef idx="minor">
+                <a:schemeClr val="tx1"/>
+              </a:fontRef>
+            </p:style>
+            <p:txBody>
+              <a:bodyPr rtlCol="0" anchor="ctr"/>
+              <a:lstStyle/>
+              <a:p>
+                <a:pPr algn="ctr"/>
+                <a:endParaRPr lang="zh-TW" altLang="en-US"/>
+              </a:p>
+            </p:txBody>
+          </p:sp>
+          <p:cxnSp>
+            <p:nvCxnSpPr>
+              <p:cNvPr id="119" name="直線接點 118"/>
+              <p:cNvCxnSpPr/>
+              <p:nvPr/>
+            </p:nvCxnSpPr>
+            <p:spPr>
+              <a:xfrm flipH="1">
+                <a:off x="7524975" y="1680025"/>
+                <a:ext cx="694942" cy="880029"/>
+              </a:xfrm>
+              <a:prstGeom prst="line">
+                <a:avLst/>
+              </a:prstGeom>
+              <a:ln w="76200">
+                <a:solidFill>
+                  <a:schemeClr val="tx1">
+                    <a:lumMod val="50000"/>
+                    <a:lumOff val="50000"/>
+                  </a:schemeClr>
+                </a:solidFill>
+              </a:ln>
+            </p:spPr>
+            <p:style>
+              <a:lnRef idx="1">
+                <a:schemeClr val="accent1"/>
+              </a:lnRef>
+              <a:fillRef idx="0">
+                <a:schemeClr val="accent1"/>
+              </a:fillRef>
+              <a:effectRef idx="0">
+                <a:schemeClr val="accent1"/>
+              </a:effectRef>
+              <a:fontRef idx="minor">
+                <a:schemeClr val="tx1"/>
+              </a:fontRef>
+            </p:style>
+          </p:cxnSp>
+          <p:cxnSp>
+            <p:nvCxnSpPr>
+              <p:cNvPr id="120" name="直線接點 119"/>
+              <p:cNvCxnSpPr/>
+              <p:nvPr/>
+            </p:nvCxnSpPr>
+            <p:spPr>
+              <a:xfrm>
+                <a:off x="8219917" y="1668879"/>
+                <a:ext cx="746145" cy="891175"/>
+              </a:xfrm>
+              <a:prstGeom prst="line">
+                <a:avLst/>
+              </a:prstGeom>
+              <a:ln w="76200">
+                <a:solidFill>
+                  <a:schemeClr val="tx1">
+                    <a:lumMod val="50000"/>
+                    <a:lumOff val="50000"/>
+                  </a:schemeClr>
+                </a:solidFill>
+              </a:ln>
+            </p:spPr>
+            <p:style>
+              <a:lnRef idx="1">
+                <a:schemeClr val="accent1"/>
+              </a:lnRef>
+              <a:fillRef idx="0">
+                <a:schemeClr val="accent1"/>
+              </a:fillRef>
+              <a:effectRef idx="0">
+                <a:schemeClr val="accent1"/>
+              </a:effectRef>
+              <a:fontRef idx="minor">
+                <a:schemeClr val="tx1"/>
+              </a:fontRef>
+            </p:style>
+          </p:cxnSp>
+          <p:cxnSp>
+            <p:nvCxnSpPr>
+              <p:cNvPr id="121" name="直線接點 120"/>
+              <p:cNvCxnSpPr/>
+              <p:nvPr/>
+            </p:nvCxnSpPr>
+            <p:spPr>
+              <a:xfrm flipV="1">
+                <a:off x="8111427" y="2560054"/>
+                <a:ext cx="854635" cy="872849"/>
+              </a:xfrm>
+              <a:prstGeom prst="line">
+                <a:avLst/>
+              </a:prstGeom>
+              <a:ln w="76200">
+                <a:solidFill>
+                  <a:schemeClr val="tx1">
+                    <a:lumMod val="50000"/>
+                    <a:lumOff val="50000"/>
+                  </a:schemeClr>
+                </a:solidFill>
+              </a:ln>
+            </p:spPr>
+            <p:style>
+              <a:lnRef idx="1">
+                <a:schemeClr val="accent1"/>
+              </a:lnRef>
+              <a:fillRef idx="0">
+                <a:schemeClr val="accent1"/>
+              </a:fillRef>
+              <a:effectRef idx="0">
+                <a:schemeClr val="accent1"/>
+              </a:effectRef>
+              <a:fontRef idx="minor">
+                <a:schemeClr val="tx1"/>
+              </a:fontRef>
+            </p:style>
+          </p:cxnSp>
+          <p:cxnSp>
+            <p:nvCxnSpPr>
+              <p:cNvPr id="122" name="直線接點 121"/>
+              <p:cNvCxnSpPr/>
+              <p:nvPr/>
+            </p:nvCxnSpPr>
+            <p:spPr>
+              <a:xfrm flipH="1" flipV="1">
+                <a:off x="8966062" y="2560054"/>
+                <a:ext cx="523830" cy="887529"/>
+              </a:xfrm>
+              <a:prstGeom prst="line">
+                <a:avLst/>
+              </a:prstGeom>
+              <a:ln w="76200">
+                <a:solidFill>
+                  <a:schemeClr val="tx1">
+                    <a:lumMod val="50000"/>
+                    <a:lumOff val="50000"/>
+                  </a:schemeClr>
+                </a:solidFill>
+              </a:ln>
+            </p:spPr>
+            <p:style>
+              <a:lnRef idx="1">
+                <a:schemeClr val="accent1"/>
+              </a:lnRef>
+              <a:fillRef idx="0">
+                <a:schemeClr val="accent1"/>
+              </a:fillRef>
+              <a:effectRef idx="0">
+                <a:schemeClr val="accent1"/>
+              </a:effectRef>
+              <a:fontRef idx="minor">
+                <a:schemeClr val="tx1"/>
+              </a:fontRef>
+            </p:style>
+          </p:cxnSp>
+          <p:cxnSp>
+            <p:nvCxnSpPr>
+              <p:cNvPr id="123" name="直線接點 122"/>
+              <p:cNvCxnSpPr/>
+              <p:nvPr/>
+            </p:nvCxnSpPr>
+            <p:spPr>
+              <a:xfrm flipV="1">
+                <a:off x="7548805" y="3432904"/>
+                <a:ext cx="562621" cy="891174"/>
+              </a:xfrm>
+              <a:prstGeom prst="line">
+                <a:avLst/>
+              </a:prstGeom>
+              <a:ln w="76200">
+                <a:solidFill>
+                  <a:schemeClr val="tx1">
+                    <a:lumMod val="50000"/>
+                    <a:lumOff val="50000"/>
+                  </a:schemeClr>
+                </a:solidFill>
+              </a:ln>
+            </p:spPr>
+            <p:style>
+              <a:lnRef idx="1">
+                <a:schemeClr val="accent1"/>
+              </a:lnRef>
+              <a:fillRef idx="0">
+                <a:schemeClr val="accent1"/>
+              </a:fillRef>
+              <a:effectRef idx="0">
+                <a:schemeClr val="accent1"/>
+              </a:effectRef>
+              <a:fontRef idx="minor">
+                <a:schemeClr val="tx1"/>
+              </a:fontRef>
+            </p:style>
+          </p:cxnSp>
+          <p:cxnSp>
+            <p:nvCxnSpPr>
+              <p:cNvPr id="124" name="直線接點 123"/>
+              <p:cNvCxnSpPr/>
+              <p:nvPr/>
+            </p:nvCxnSpPr>
+            <p:spPr>
+              <a:xfrm flipV="1">
+                <a:off x="8787826" y="3440084"/>
+                <a:ext cx="702065" cy="882264"/>
+              </a:xfrm>
+              <a:prstGeom prst="line">
+                <a:avLst/>
+              </a:prstGeom>
+              <a:ln w="76200">
+                <a:solidFill>
+                  <a:schemeClr val="tx1">
+                    <a:lumMod val="50000"/>
+                    <a:lumOff val="50000"/>
+                  </a:schemeClr>
+                </a:solidFill>
+              </a:ln>
+            </p:spPr>
+            <p:style>
+              <a:lnRef idx="1">
+                <a:schemeClr val="accent1"/>
+              </a:lnRef>
+              <a:fillRef idx="0">
+                <a:schemeClr val="accent1"/>
+              </a:fillRef>
+              <a:effectRef idx="0">
+                <a:schemeClr val="accent1"/>
+              </a:effectRef>
+              <a:fontRef idx="minor">
+                <a:schemeClr val="tx1"/>
+              </a:fontRef>
+            </p:style>
+          </p:cxnSp>
+          <p:cxnSp>
+            <p:nvCxnSpPr>
+              <p:cNvPr id="125" name="直線接點 124"/>
+              <p:cNvCxnSpPr/>
+              <p:nvPr/>
+            </p:nvCxnSpPr>
+            <p:spPr>
+              <a:xfrm flipH="1" flipV="1">
+                <a:off x="9489891" y="3440083"/>
+                <a:ext cx="410602" cy="883995"/>
+              </a:xfrm>
+              <a:prstGeom prst="line">
+                <a:avLst/>
+              </a:prstGeom>
+              <a:ln w="76200">
+                <a:solidFill>
+                  <a:schemeClr val="tx1">
+                    <a:lumMod val="50000"/>
+                    <a:lumOff val="50000"/>
+                  </a:schemeClr>
+                </a:solidFill>
+              </a:ln>
+            </p:spPr>
+            <p:style>
+              <a:lnRef idx="1">
+                <a:schemeClr val="accent1"/>
+              </a:lnRef>
+              <a:fillRef idx="0">
+                <a:schemeClr val="accent1"/>
+              </a:fillRef>
+              <a:effectRef idx="0">
+                <a:schemeClr val="accent1"/>
+              </a:effectRef>
+              <a:fontRef idx="minor">
+                <a:schemeClr val="tx1"/>
+              </a:fontRef>
+            </p:style>
+          </p:cxnSp>
+          <p:cxnSp>
+            <p:nvCxnSpPr>
+              <p:cNvPr id="126" name="直線接點 125"/>
+              <p:cNvCxnSpPr/>
+              <p:nvPr/>
+            </p:nvCxnSpPr>
+            <p:spPr>
+              <a:xfrm>
+                <a:off x="8787826" y="4322348"/>
+                <a:ext cx="565397" cy="985333"/>
+              </a:xfrm>
+              <a:prstGeom prst="line">
+                <a:avLst/>
+              </a:prstGeom>
+              <a:ln w="76200">
+                <a:solidFill>
+                  <a:schemeClr val="tx1">
+                    <a:lumMod val="50000"/>
+                    <a:lumOff val="50000"/>
+                  </a:schemeClr>
+                </a:solidFill>
+              </a:ln>
+            </p:spPr>
+            <p:style>
+              <a:lnRef idx="1">
+                <a:schemeClr val="accent1"/>
+              </a:lnRef>
+              <a:fillRef idx="0">
+                <a:schemeClr val="accent1"/>
+              </a:fillRef>
+              <a:effectRef idx="0">
+                <a:schemeClr val="accent1"/>
+              </a:effectRef>
+              <a:fontRef idx="minor">
+                <a:schemeClr val="tx1"/>
+              </a:fontRef>
+            </p:style>
+          </p:cxnSp>
+          <p:cxnSp>
+            <p:nvCxnSpPr>
+              <p:cNvPr id="127" name="直線接點 126"/>
+              <p:cNvCxnSpPr/>
+              <p:nvPr/>
+            </p:nvCxnSpPr>
+            <p:spPr>
+              <a:xfrm>
+                <a:off x="8219916" y="796030"/>
+                <a:ext cx="0" cy="883995"/>
+              </a:xfrm>
+              <a:prstGeom prst="line">
+                <a:avLst/>
+              </a:prstGeom>
+              <a:ln w="76200">
+                <a:solidFill>
+                  <a:schemeClr val="tx1">
+                    <a:lumMod val="50000"/>
+                    <a:lumOff val="50000"/>
+                  </a:schemeClr>
+                </a:solidFill>
+              </a:ln>
+            </p:spPr>
+            <p:style>
+              <a:lnRef idx="1">
+                <a:schemeClr val="accent1"/>
+              </a:lnRef>
+              <a:fillRef idx="0">
+                <a:schemeClr val="accent1"/>
+              </a:fillRef>
+              <a:effectRef idx="0">
+                <a:schemeClr val="accent1"/>
+              </a:effectRef>
+              <a:fontRef idx="minor">
+                <a:schemeClr val="tx1"/>
+              </a:fontRef>
+            </p:style>
+          </p:cxnSp>
+          <p:sp>
+            <p:nvSpPr>
+              <p:cNvPr id="128" name="橢圓 127"/>
+              <p:cNvSpPr/>
+              <p:nvPr/>
+            </p:nvSpPr>
+            <p:spPr>
+              <a:xfrm>
+                <a:off x="7946581" y="528480"/>
+                <a:ext cx="546671" cy="535100"/>
+              </a:xfrm>
+              <a:prstGeom prst="ellipse">
+                <a:avLst/>
+              </a:prstGeom>
               <a:solidFill>
                 <a:schemeClr val="tx1">
-                  <a:lumMod val="50000"/>
-                  <a:lumOff val="50000"/>
+                  <a:lumMod val="75000"/>
+                  <a:lumOff val="25000"/>
                 </a:schemeClr>
               </a:solidFill>
-            </a:ln>
-          </p:spPr>
-          <p:style>
-            <a:lnRef idx="1">
-              <a:schemeClr val="accent1"/>
-            </a:lnRef>
-            <a:fillRef idx="0">
-              <a:schemeClr val="accent1"/>
-            </a:fillRef>
-            <a:effectRef idx="0">
-              <a:schemeClr val="accent1"/>
-            </a:effectRef>
-            <a:fontRef idx="minor">
-              <a:schemeClr val="tx1"/>
-            </a:fontRef>
-          </p:style>
-        </p:cxnSp>
-        <p:cxnSp>
-          <p:nvCxnSpPr>
-            <p:cNvPr id="52" name="直線接點 51"/>
-            <p:cNvCxnSpPr/>
-            <p:nvPr/>
-          </p:nvCxnSpPr>
-          <p:spPr>
-            <a:xfrm flipH="1" flipV="1">
-              <a:off x="5526848" y="1023707"/>
-              <a:ext cx="847555" cy="881135"/>
-            </a:xfrm>
-            <a:prstGeom prst="line">
-              <a:avLst/>
-            </a:prstGeom>
-            <a:ln w="76200">
+              <a:ln>
+                <a:noFill/>
+              </a:ln>
+              <a:effectLst/>
+            </p:spPr>
+            <p:style>
+              <a:lnRef idx="2">
+                <a:schemeClr val="accent1">
+                  <a:shade val="50000"/>
+                </a:schemeClr>
+              </a:lnRef>
+              <a:fillRef idx="1">
+                <a:schemeClr val="accent1"/>
+              </a:fillRef>
+              <a:effectRef idx="0">
+                <a:schemeClr val="accent1"/>
+              </a:effectRef>
+              <a:fontRef idx="minor">
+                <a:schemeClr val="lt1"/>
+              </a:fontRef>
+            </p:style>
+            <p:txBody>
+              <a:bodyPr rtlCol="0" anchor="ctr"/>
+              <a:lstStyle/>
+              <a:p>
+                <a:pPr algn="ctr"/>
+                <a:r>
+                  <a:rPr lang="en-US" altLang="zh-TW" sz="2400" dirty="0" smtClean="0">
+                    <a:latin typeface="Menlo" panose="020B0609030804020204" pitchFamily="49" charset="0"/>
+                    <a:cs typeface="Menlo" panose="020B0609030804020204" pitchFamily="49" charset="0"/>
+                  </a:rPr>
+                  <a:t>0</a:t>
+                </a:r>
+                <a:endParaRPr lang="zh-TW" altLang="en-US" sz="2400" dirty="0">
+                  <a:latin typeface="Menlo" panose="020B0609030804020204" pitchFamily="49" charset="0"/>
+                  <a:cs typeface="Menlo" panose="020B0609030804020204" pitchFamily="49" charset="0"/>
+                </a:endParaRPr>
+              </a:p>
+            </p:txBody>
+          </p:sp>
+          <p:sp>
+            <p:nvSpPr>
+              <p:cNvPr id="129" name="橢圓 128"/>
+              <p:cNvSpPr/>
+              <p:nvPr/>
+            </p:nvSpPr>
+            <p:spPr>
+              <a:xfrm>
+                <a:off x="7946583" y="1412475"/>
+                <a:ext cx="546671" cy="535100"/>
+              </a:xfrm>
+              <a:prstGeom prst="ellipse">
+                <a:avLst/>
+              </a:prstGeom>
               <a:solidFill>
                 <a:schemeClr val="tx1">
-                  <a:lumMod val="50000"/>
-                  <a:lumOff val="50000"/>
+                  <a:lumMod val="75000"/>
+                  <a:lumOff val="25000"/>
                 </a:schemeClr>
               </a:solidFill>
-            </a:ln>
-          </p:spPr>
-          <p:style>
-            <a:lnRef idx="1">
-              <a:schemeClr val="accent1"/>
-            </a:lnRef>
-            <a:fillRef idx="0">
-              <a:schemeClr val="accent1"/>
-            </a:fillRef>
-            <a:effectRef idx="0">
-              <a:schemeClr val="accent1"/>
-            </a:effectRef>
-            <a:fontRef idx="minor">
-              <a:schemeClr val="tx1"/>
-            </a:fontRef>
-          </p:style>
-        </p:cxnSp>
-        <p:cxnSp>
-          <p:nvCxnSpPr>
-            <p:cNvPr id="55" name="直線接點 54"/>
-            <p:cNvCxnSpPr/>
-            <p:nvPr/>
-          </p:nvCxnSpPr>
-          <p:spPr>
-            <a:xfrm flipH="1" flipV="1">
-              <a:off x="6374403" y="1912478"/>
-              <a:ext cx="858030" cy="808008"/>
-            </a:xfrm>
-            <a:prstGeom prst="line">
-              <a:avLst/>
-            </a:prstGeom>
-            <a:ln w="76200">
+              <a:ln>
+                <a:noFill/>
+              </a:ln>
+              <a:effectLst/>
+            </p:spPr>
+            <p:style>
+              <a:lnRef idx="2">
+                <a:schemeClr val="accent1">
+                  <a:shade val="50000"/>
+                </a:schemeClr>
+              </a:lnRef>
+              <a:fillRef idx="1">
+                <a:schemeClr val="accent1"/>
+              </a:fillRef>
+              <a:effectRef idx="0">
+                <a:schemeClr val="accent1"/>
+              </a:effectRef>
+              <a:fontRef idx="minor">
+                <a:schemeClr val="lt1"/>
+              </a:fontRef>
+            </p:style>
+            <p:txBody>
+              <a:bodyPr rtlCol="0" anchor="ctr"/>
+              <a:lstStyle/>
+              <a:p>
+                <a:pPr algn="ctr"/>
+                <a:r>
+                  <a:rPr lang="en-US" altLang="zh-TW" sz="2400" dirty="0" smtClean="0">
+                    <a:latin typeface="Menlo" panose="020B0609030804020204" pitchFamily="49" charset="0"/>
+                    <a:cs typeface="Menlo" panose="020B0609030804020204" pitchFamily="49" charset="0"/>
+                  </a:rPr>
+                  <a:t>1</a:t>
+                </a:r>
+                <a:endParaRPr lang="zh-TW" altLang="en-US" sz="2400" dirty="0">
+                  <a:latin typeface="Menlo" panose="020B0609030804020204" pitchFamily="49" charset="0"/>
+                  <a:cs typeface="Menlo" panose="020B0609030804020204" pitchFamily="49" charset="0"/>
+                </a:endParaRPr>
+              </a:p>
+            </p:txBody>
+          </p:sp>
+          <p:sp>
+            <p:nvSpPr>
+              <p:cNvPr id="130" name="橢圓 129"/>
+              <p:cNvSpPr/>
+              <p:nvPr/>
+            </p:nvSpPr>
+            <p:spPr>
+              <a:xfrm>
+                <a:off x="7251640" y="2298032"/>
+                <a:ext cx="546671" cy="535100"/>
+              </a:xfrm>
+              <a:prstGeom prst="ellipse">
+                <a:avLst/>
+              </a:prstGeom>
               <a:solidFill>
                 <a:schemeClr val="tx1">
-                  <a:lumMod val="50000"/>
-                  <a:lumOff val="50000"/>
+                  <a:lumMod val="75000"/>
+                  <a:lumOff val="25000"/>
                 </a:schemeClr>
               </a:solidFill>
-            </a:ln>
-          </p:spPr>
-          <p:style>
-            <a:lnRef idx="1">
-              <a:schemeClr val="accent1"/>
-            </a:lnRef>
-            <a:fillRef idx="0">
-              <a:schemeClr val="accent1"/>
-            </a:fillRef>
-            <a:effectRef idx="0">
-              <a:schemeClr val="accent1"/>
-            </a:effectRef>
-            <a:fontRef idx="minor">
-              <a:schemeClr val="tx1"/>
-            </a:fontRef>
-          </p:style>
-        </p:cxnSp>
-        <p:cxnSp>
-          <p:nvCxnSpPr>
-            <p:cNvPr id="58" name="直線接點 57"/>
-            <p:cNvCxnSpPr/>
-            <p:nvPr/>
-          </p:nvCxnSpPr>
-          <p:spPr>
-            <a:xfrm flipV="1">
-              <a:off x="3898472" y="1912478"/>
-              <a:ext cx="758774" cy="858573"/>
-            </a:xfrm>
-            <a:prstGeom prst="line">
-              <a:avLst/>
-            </a:prstGeom>
-            <a:ln w="76200">
+              <a:ln>
+                <a:noFill/>
+              </a:ln>
+              <a:effectLst/>
+            </p:spPr>
+            <p:style>
+              <a:lnRef idx="2">
+                <a:schemeClr val="accent1">
+                  <a:shade val="50000"/>
+                </a:schemeClr>
+              </a:lnRef>
+              <a:fillRef idx="1">
+                <a:schemeClr val="accent1"/>
+              </a:fillRef>
+              <a:effectRef idx="0">
+                <a:schemeClr val="accent1"/>
+              </a:effectRef>
+              <a:fontRef idx="minor">
+                <a:schemeClr val="lt1"/>
+              </a:fontRef>
+            </p:style>
+            <p:txBody>
+              <a:bodyPr rtlCol="0" anchor="ctr"/>
+              <a:lstStyle/>
+              <a:p>
+                <a:pPr algn="ctr"/>
+                <a:r>
+                  <a:rPr lang="en-US" altLang="zh-TW" sz="2400" dirty="0">
+                    <a:latin typeface="Menlo" panose="020B0609030804020204" pitchFamily="49" charset="0"/>
+                    <a:cs typeface="Menlo" panose="020B0609030804020204" pitchFamily="49" charset="0"/>
+                  </a:rPr>
+                  <a:t>9</a:t>
+                </a:r>
+                <a:endParaRPr lang="zh-TW" altLang="en-US" sz="2400" dirty="0">
+                  <a:latin typeface="Menlo" panose="020B0609030804020204" pitchFamily="49" charset="0"/>
+                  <a:cs typeface="Menlo" panose="020B0609030804020204" pitchFamily="49" charset="0"/>
+                </a:endParaRPr>
+              </a:p>
+            </p:txBody>
+          </p:sp>
+          <p:sp>
+            <p:nvSpPr>
+              <p:cNvPr id="131" name="橢圓 130"/>
+              <p:cNvSpPr/>
+              <p:nvPr/>
+            </p:nvSpPr>
+            <p:spPr>
+              <a:xfrm>
+                <a:off x="8692727" y="2292504"/>
+                <a:ext cx="546671" cy="535100"/>
+              </a:xfrm>
+              <a:prstGeom prst="ellipse">
+                <a:avLst/>
+              </a:prstGeom>
               <a:solidFill>
                 <a:schemeClr val="tx1">
-                  <a:lumMod val="50000"/>
-                  <a:lumOff val="50000"/>
+                  <a:lumMod val="75000"/>
+                  <a:lumOff val="25000"/>
                 </a:schemeClr>
               </a:solidFill>
-            </a:ln>
-          </p:spPr>
-          <p:style>
-            <a:lnRef idx="1">
-              <a:schemeClr val="accent1"/>
-            </a:lnRef>
-            <a:fillRef idx="0">
-              <a:schemeClr val="accent1"/>
-            </a:fillRef>
-            <a:effectRef idx="0">
-              <a:schemeClr val="accent1"/>
-            </a:effectRef>
-            <a:fontRef idx="minor">
-              <a:schemeClr val="tx1"/>
-            </a:fontRef>
-          </p:style>
-        </p:cxnSp>
-        <p:cxnSp>
-          <p:nvCxnSpPr>
-            <p:cNvPr id="65" name="直線接點 64"/>
-            <p:cNvCxnSpPr/>
-            <p:nvPr/>
-          </p:nvCxnSpPr>
-          <p:spPr>
-            <a:xfrm flipH="1" flipV="1">
-              <a:off x="4663032" y="1912478"/>
-              <a:ext cx="896602" cy="1132968"/>
-            </a:xfrm>
-            <a:prstGeom prst="line">
-              <a:avLst/>
-            </a:prstGeom>
-            <a:ln w="76200">
+              <a:ln>
+                <a:noFill/>
+              </a:ln>
+              <a:effectLst/>
+            </p:spPr>
+            <p:style>
+              <a:lnRef idx="2">
+                <a:schemeClr val="accent1">
+                  <a:shade val="50000"/>
+                </a:schemeClr>
+              </a:lnRef>
+              <a:fillRef idx="1">
+                <a:schemeClr val="accent1"/>
+              </a:fillRef>
+              <a:effectRef idx="0">
+                <a:schemeClr val="accent1"/>
+              </a:effectRef>
+              <a:fontRef idx="minor">
+                <a:schemeClr val="lt1"/>
+              </a:fontRef>
+            </p:style>
+            <p:txBody>
+              <a:bodyPr rtlCol="0" anchor="ctr"/>
+              <a:lstStyle/>
+              <a:p>
+                <a:pPr algn="ctr"/>
+                <a:r>
+                  <a:rPr lang="en-US" altLang="zh-TW" sz="2400" dirty="0" smtClean="0">
+                    <a:latin typeface="Menlo" panose="020B0609030804020204" pitchFamily="49" charset="0"/>
+                    <a:cs typeface="Menlo" panose="020B0609030804020204" pitchFamily="49" charset="0"/>
+                  </a:rPr>
+                  <a:t>4</a:t>
+                </a:r>
+                <a:endParaRPr lang="zh-TW" altLang="en-US" sz="2400" dirty="0">
+                  <a:latin typeface="Menlo" panose="020B0609030804020204" pitchFamily="49" charset="0"/>
+                  <a:cs typeface="Menlo" panose="020B0609030804020204" pitchFamily="49" charset="0"/>
+                </a:endParaRPr>
+              </a:p>
+            </p:txBody>
+          </p:sp>
+          <p:sp>
+            <p:nvSpPr>
+              <p:cNvPr id="132" name="橢圓 131"/>
+              <p:cNvSpPr/>
+              <p:nvPr/>
+            </p:nvSpPr>
+            <p:spPr>
+              <a:xfrm>
+                <a:off x="9631347" y="4061462"/>
+                <a:ext cx="546671" cy="535100"/>
+              </a:xfrm>
+              <a:prstGeom prst="ellipse">
+                <a:avLst/>
+              </a:prstGeom>
               <a:solidFill>
                 <a:schemeClr val="tx1">
-                  <a:lumMod val="50000"/>
-                  <a:lumOff val="50000"/>
+                  <a:lumMod val="75000"/>
+                  <a:lumOff val="25000"/>
                 </a:schemeClr>
               </a:solidFill>
-            </a:ln>
-          </p:spPr>
-          <p:style>
-            <a:lnRef idx="1">
-              <a:schemeClr val="accent1"/>
-            </a:lnRef>
-            <a:fillRef idx="0">
-              <a:schemeClr val="accent1"/>
-            </a:fillRef>
-            <a:effectRef idx="0">
-              <a:schemeClr val="accent1"/>
-            </a:effectRef>
-            <a:fontRef idx="minor">
-              <a:schemeClr val="tx1"/>
-            </a:fontRef>
-          </p:style>
-        </p:cxnSp>
-        <p:cxnSp>
-          <p:nvCxnSpPr>
-            <p:cNvPr id="68" name="直線接點 67"/>
-            <p:cNvCxnSpPr/>
-            <p:nvPr/>
-          </p:nvCxnSpPr>
-          <p:spPr>
-            <a:xfrm flipV="1">
-              <a:off x="5570507" y="1912478"/>
-              <a:ext cx="803896" cy="1126123"/>
-            </a:xfrm>
-            <a:prstGeom prst="line">
-              <a:avLst/>
-            </a:prstGeom>
-            <a:ln w="76200">
+              <a:ln>
+                <a:noFill/>
+              </a:ln>
+              <a:effectLst/>
+            </p:spPr>
+            <p:style>
+              <a:lnRef idx="2">
+                <a:schemeClr val="accent1">
+                  <a:shade val="50000"/>
+                </a:schemeClr>
+              </a:lnRef>
+              <a:fillRef idx="1">
+                <a:schemeClr val="accent1"/>
+              </a:fillRef>
+              <a:effectRef idx="0">
+                <a:schemeClr val="accent1"/>
+              </a:effectRef>
+              <a:fontRef idx="minor">
+                <a:schemeClr val="lt1"/>
+              </a:fontRef>
+            </p:style>
+            <p:txBody>
+              <a:bodyPr rtlCol="0" anchor="ctr"/>
+              <a:lstStyle/>
+              <a:p>
+                <a:pPr algn="ctr"/>
+                <a:r>
+                  <a:rPr lang="en-US" altLang="zh-TW" sz="2400" dirty="0" smtClean="0">
+                    <a:latin typeface="Menlo" panose="020B0609030804020204" pitchFamily="49" charset="0"/>
+                    <a:cs typeface="Menlo" panose="020B0609030804020204" pitchFamily="49" charset="0"/>
+                  </a:rPr>
+                  <a:t>6</a:t>
+                </a:r>
+                <a:endParaRPr lang="zh-TW" altLang="en-US" sz="2400" dirty="0">
+                  <a:latin typeface="Menlo" panose="020B0609030804020204" pitchFamily="49" charset="0"/>
+                  <a:cs typeface="Menlo" panose="020B0609030804020204" pitchFamily="49" charset="0"/>
+                </a:endParaRPr>
+              </a:p>
+            </p:txBody>
+          </p:sp>
+          <p:sp>
+            <p:nvSpPr>
+              <p:cNvPr id="133" name="橢圓 132"/>
+              <p:cNvSpPr/>
+              <p:nvPr/>
+            </p:nvSpPr>
+            <p:spPr>
+              <a:xfrm>
+                <a:off x="9216557" y="3180033"/>
+                <a:ext cx="546671" cy="535100"/>
+              </a:xfrm>
+              <a:prstGeom prst="ellipse">
+                <a:avLst/>
+              </a:prstGeom>
               <a:solidFill>
                 <a:schemeClr val="tx1">
-                  <a:lumMod val="50000"/>
-                  <a:lumOff val="50000"/>
+                  <a:lumMod val="75000"/>
+                  <a:lumOff val="25000"/>
                 </a:schemeClr>
               </a:solidFill>
-            </a:ln>
-          </p:spPr>
-          <p:style>
-            <a:lnRef idx="1">
-              <a:schemeClr val="accent1"/>
-            </a:lnRef>
-            <a:fillRef idx="0">
-              <a:schemeClr val="accent1"/>
-            </a:fillRef>
-            <a:effectRef idx="0">
-              <a:schemeClr val="accent1"/>
-            </a:effectRef>
-            <a:fontRef idx="minor">
-              <a:schemeClr val="tx1"/>
-            </a:fontRef>
-          </p:style>
-        </p:cxnSp>
-        <p:cxnSp>
-          <p:nvCxnSpPr>
-            <p:cNvPr id="71" name="直線接點 70"/>
-            <p:cNvCxnSpPr/>
-            <p:nvPr/>
-          </p:nvCxnSpPr>
-          <p:spPr>
-            <a:xfrm flipH="1">
-              <a:off x="4520580" y="3038601"/>
-              <a:ext cx="1049927" cy="858573"/>
-            </a:xfrm>
-            <a:prstGeom prst="line">
-              <a:avLst/>
-            </a:prstGeom>
-            <a:ln w="76200">
+              <a:ln>
+                <a:noFill/>
+              </a:ln>
+              <a:effectLst/>
+            </p:spPr>
+            <p:style>
+              <a:lnRef idx="2">
+                <a:schemeClr val="accent1">
+                  <a:shade val="50000"/>
+                </a:schemeClr>
+              </a:lnRef>
+              <a:fillRef idx="1">
+                <a:schemeClr val="accent1"/>
+              </a:fillRef>
+              <a:effectRef idx="0">
+                <a:schemeClr val="accent1"/>
+              </a:effectRef>
+              <a:fontRef idx="minor">
+                <a:schemeClr val="lt1"/>
+              </a:fontRef>
+            </p:style>
+            <p:txBody>
+              <a:bodyPr rtlCol="0" anchor="ctr"/>
+              <a:lstStyle/>
+              <a:p>
+                <a:pPr algn="ctr"/>
+                <a:r>
+                  <a:rPr lang="en-US" altLang="zh-TW" sz="2400" dirty="0" smtClean="0">
+                    <a:latin typeface="Menlo" panose="020B0609030804020204" pitchFamily="49" charset="0"/>
+                    <a:cs typeface="Menlo" panose="020B0609030804020204" pitchFamily="49" charset="0"/>
+                  </a:rPr>
+                  <a:t>5</a:t>
+                </a:r>
+                <a:endParaRPr lang="zh-TW" altLang="en-US" sz="2400" dirty="0">
+                  <a:latin typeface="Menlo" panose="020B0609030804020204" pitchFamily="49" charset="0"/>
+                  <a:cs typeface="Menlo" panose="020B0609030804020204" pitchFamily="49" charset="0"/>
+                </a:endParaRPr>
+              </a:p>
+            </p:txBody>
+          </p:sp>
+          <p:sp>
+            <p:nvSpPr>
+              <p:cNvPr id="134" name="橢圓 133"/>
+              <p:cNvSpPr/>
+              <p:nvPr/>
+            </p:nvSpPr>
+            <p:spPr>
+              <a:xfrm>
+                <a:off x="8520192" y="4062573"/>
+                <a:ext cx="546671" cy="535100"/>
+              </a:xfrm>
+              <a:prstGeom prst="ellipse">
+                <a:avLst/>
+              </a:prstGeom>
               <a:solidFill>
                 <a:schemeClr val="tx1">
-                  <a:lumMod val="50000"/>
-                  <a:lumOff val="50000"/>
+                  <a:lumMod val="75000"/>
+                  <a:lumOff val="25000"/>
                 </a:schemeClr>
               </a:solidFill>
-            </a:ln>
-          </p:spPr>
-          <p:style>
-            <a:lnRef idx="1">
-              <a:schemeClr val="accent1"/>
-            </a:lnRef>
-            <a:fillRef idx="0">
-              <a:schemeClr val="accent1"/>
-            </a:fillRef>
-            <a:effectRef idx="0">
-              <a:schemeClr val="accent1"/>
-            </a:effectRef>
-            <a:fontRef idx="minor">
-              <a:schemeClr val="tx1"/>
-            </a:fontRef>
-          </p:style>
-        </p:cxnSp>
-        <p:cxnSp>
-          <p:nvCxnSpPr>
-            <p:cNvPr id="74" name="直線接點 73"/>
-            <p:cNvCxnSpPr/>
-            <p:nvPr/>
-          </p:nvCxnSpPr>
-          <p:spPr>
-            <a:xfrm flipH="1" flipV="1">
-              <a:off x="4520580" y="3890329"/>
-              <a:ext cx="436752" cy="1233190"/>
-            </a:xfrm>
-            <a:prstGeom prst="line">
-              <a:avLst/>
-            </a:prstGeom>
-            <a:ln w="76200">
+              <a:ln>
+                <a:noFill/>
+              </a:ln>
+              <a:effectLst/>
+            </p:spPr>
+            <p:style>
+              <a:lnRef idx="2">
+                <a:schemeClr val="accent1">
+                  <a:shade val="50000"/>
+                </a:schemeClr>
+              </a:lnRef>
+              <a:fillRef idx="1">
+                <a:schemeClr val="accent1"/>
+              </a:fillRef>
+              <a:effectRef idx="0">
+                <a:schemeClr val="accent1"/>
+              </a:effectRef>
+              <a:fontRef idx="minor">
+                <a:schemeClr val="lt1"/>
+              </a:fontRef>
+            </p:style>
+            <p:txBody>
+              <a:bodyPr rtlCol="0" anchor="ctr"/>
+              <a:lstStyle/>
+              <a:p>
+                <a:pPr algn="ctr"/>
+                <a:r>
+                  <a:rPr lang="en-US" altLang="zh-TW" sz="2400" dirty="0">
+                    <a:latin typeface="Menlo" panose="020B0609030804020204" pitchFamily="49" charset="0"/>
+                    <a:cs typeface="Menlo" panose="020B0609030804020204" pitchFamily="49" charset="0"/>
+                  </a:rPr>
+                  <a:t>7</a:t>
+                </a:r>
+                <a:endParaRPr lang="zh-TW" altLang="en-US" sz="2400" dirty="0">
+                  <a:latin typeface="Menlo" panose="020B0609030804020204" pitchFamily="49" charset="0"/>
+                  <a:cs typeface="Menlo" panose="020B0609030804020204" pitchFamily="49" charset="0"/>
+                </a:endParaRPr>
+              </a:p>
+            </p:txBody>
+          </p:sp>
+          <p:sp>
+            <p:nvSpPr>
+              <p:cNvPr id="135" name="橢圓 134"/>
+              <p:cNvSpPr/>
+              <p:nvPr/>
+            </p:nvSpPr>
+            <p:spPr>
+              <a:xfrm>
+                <a:off x="9084676" y="5040131"/>
+                <a:ext cx="546671" cy="535100"/>
+              </a:xfrm>
+              <a:prstGeom prst="ellipse">
+                <a:avLst/>
+              </a:prstGeom>
               <a:solidFill>
                 <a:schemeClr val="tx1">
-                  <a:lumMod val="50000"/>
-                  <a:lumOff val="50000"/>
+                  <a:lumMod val="75000"/>
+                  <a:lumOff val="25000"/>
                 </a:schemeClr>
               </a:solidFill>
-            </a:ln>
-          </p:spPr>
-          <p:style>
-            <a:lnRef idx="1">
-              <a:schemeClr val="accent1"/>
-            </a:lnRef>
-            <a:fillRef idx="0">
-              <a:schemeClr val="accent1"/>
-            </a:fillRef>
-            <a:effectRef idx="0">
-              <a:schemeClr val="accent1"/>
-            </a:effectRef>
-            <a:fontRef idx="minor">
-              <a:schemeClr val="tx1"/>
-            </a:fontRef>
-          </p:style>
-        </p:cxnSp>
-        <p:cxnSp>
-          <p:nvCxnSpPr>
-            <p:cNvPr id="77" name="直線接點 76"/>
-            <p:cNvCxnSpPr/>
-            <p:nvPr/>
-          </p:nvCxnSpPr>
-          <p:spPr>
-            <a:xfrm flipV="1">
-              <a:off x="6288226" y="3890329"/>
-              <a:ext cx="480834" cy="1233190"/>
-            </a:xfrm>
-            <a:prstGeom prst="line">
-              <a:avLst/>
-            </a:prstGeom>
-            <a:ln w="76200">
+              <a:ln>
+                <a:noFill/>
+              </a:ln>
+              <a:effectLst/>
+            </p:spPr>
+            <p:style>
+              <a:lnRef idx="2">
+                <a:schemeClr val="accent1">
+                  <a:shade val="50000"/>
+                </a:schemeClr>
+              </a:lnRef>
+              <a:fillRef idx="1">
+                <a:schemeClr val="accent1"/>
+              </a:fillRef>
+              <a:effectRef idx="0">
+                <a:schemeClr val="accent1"/>
+              </a:effectRef>
+              <a:fontRef idx="minor">
+                <a:schemeClr val="lt1"/>
+              </a:fontRef>
+            </p:style>
+            <p:txBody>
+              <a:bodyPr rtlCol="0" anchor="ctr"/>
+              <a:lstStyle/>
+              <a:p>
+                <a:pPr algn="ctr"/>
+                <a:r>
+                  <a:rPr lang="en-US" altLang="zh-TW" sz="2400" dirty="0" smtClean="0">
+                    <a:latin typeface="Menlo" panose="020B0609030804020204" pitchFamily="49" charset="0"/>
+                    <a:cs typeface="Menlo" panose="020B0609030804020204" pitchFamily="49" charset="0"/>
+                  </a:rPr>
+                  <a:t>8</a:t>
+                </a:r>
+                <a:endParaRPr lang="zh-TW" altLang="en-US" sz="2400" dirty="0">
+                  <a:latin typeface="Menlo" panose="020B0609030804020204" pitchFamily="49" charset="0"/>
+                  <a:cs typeface="Menlo" panose="020B0609030804020204" pitchFamily="49" charset="0"/>
+                </a:endParaRPr>
+              </a:p>
+            </p:txBody>
+          </p:sp>
+          <p:sp>
+            <p:nvSpPr>
+              <p:cNvPr id="136" name="橢圓 135"/>
+              <p:cNvSpPr/>
+              <p:nvPr/>
+            </p:nvSpPr>
+            <p:spPr>
+              <a:xfrm>
+                <a:off x="7269403" y="4056528"/>
+                <a:ext cx="546671" cy="535100"/>
+              </a:xfrm>
+              <a:prstGeom prst="ellipse">
+                <a:avLst/>
+              </a:prstGeom>
               <a:solidFill>
                 <a:schemeClr val="tx1">
-                  <a:lumMod val="50000"/>
-                  <a:lumOff val="50000"/>
+                  <a:lumMod val="75000"/>
+                  <a:lumOff val="25000"/>
                 </a:schemeClr>
               </a:solidFill>
-            </a:ln>
-          </p:spPr>
-          <p:style>
-            <a:lnRef idx="1">
-              <a:schemeClr val="accent1"/>
-            </a:lnRef>
-            <a:fillRef idx="0">
-              <a:schemeClr val="accent1"/>
-            </a:fillRef>
-            <a:effectRef idx="0">
-              <a:schemeClr val="accent1"/>
-            </a:effectRef>
-            <a:fontRef idx="minor">
-              <a:schemeClr val="tx1"/>
-            </a:fontRef>
-          </p:style>
-        </p:cxnSp>
-        <p:cxnSp>
-          <p:nvCxnSpPr>
-            <p:cNvPr id="80" name="直線接點 79"/>
-            <p:cNvCxnSpPr/>
-            <p:nvPr/>
-          </p:nvCxnSpPr>
-          <p:spPr>
-            <a:xfrm flipH="1">
-              <a:off x="4957332" y="5123519"/>
-              <a:ext cx="1330894" cy="0"/>
-            </a:xfrm>
-            <a:prstGeom prst="line">
-              <a:avLst/>
-            </a:prstGeom>
-            <a:ln w="76200">
+              <a:ln>
+                <a:noFill/>
+              </a:ln>
+              <a:effectLst/>
+            </p:spPr>
+            <p:style>
+              <a:lnRef idx="2">
+                <a:schemeClr val="accent1">
+                  <a:shade val="50000"/>
+                </a:schemeClr>
+              </a:lnRef>
+              <a:fillRef idx="1">
+                <a:schemeClr val="accent1"/>
+              </a:fillRef>
+              <a:effectRef idx="0">
+                <a:schemeClr val="accent1"/>
+              </a:effectRef>
+              <a:fontRef idx="minor">
+                <a:schemeClr val="lt1"/>
+              </a:fontRef>
+            </p:style>
+            <p:txBody>
+              <a:bodyPr rtlCol="0" anchor="ctr"/>
+              <a:lstStyle/>
+              <a:p>
+                <a:pPr algn="ctr"/>
+                <a:r>
+                  <a:rPr lang="en-US" altLang="zh-TW" sz="2400" dirty="0" smtClean="0">
+                    <a:latin typeface="Menlo" panose="020B0609030804020204" pitchFamily="49" charset="0"/>
+                    <a:cs typeface="Menlo" panose="020B0609030804020204" pitchFamily="49" charset="0"/>
+                  </a:rPr>
+                  <a:t>3</a:t>
+                </a:r>
+                <a:endParaRPr lang="zh-TW" altLang="en-US" sz="2400" dirty="0">
+                  <a:latin typeface="Menlo" panose="020B0609030804020204" pitchFamily="49" charset="0"/>
+                  <a:cs typeface="Menlo" panose="020B0609030804020204" pitchFamily="49" charset="0"/>
+                </a:endParaRPr>
+              </a:p>
+            </p:txBody>
+          </p:sp>
+          <p:sp>
+            <p:nvSpPr>
+              <p:cNvPr id="137" name="橢圓 136"/>
+              <p:cNvSpPr/>
+              <p:nvPr/>
+            </p:nvSpPr>
+            <p:spPr>
+              <a:xfrm>
+                <a:off x="7838092" y="3165353"/>
+                <a:ext cx="546671" cy="535100"/>
+              </a:xfrm>
+              <a:prstGeom prst="ellipse">
+                <a:avLst/>
+              </a:prstGeom>
               <a:solidFill>
                 <a:schemeClr val="tx1">
-                  <a:lumMod val="50000"/>
-                  <a:lumOff val="50000"/>
+                  <a:lumMod val="75000"/>
+                  <a:lumOff val="25000"/>
                 </a:schemeClr>
               </a:solidFill>
-            </a:ln>
-          </p:spPr>
-          <p:style>
-            <a:lnRef idx="1">
-              <a:schemeClr val="accent1"/>
-            </a:lnRef>
-            <a:fillRef idx="0">
-              <a:schemeClr val="accent1"/>
-            </a:fillRef>
-            <a:effectRef idx="0">
-              <a:schemeClr val="accent1"/>
-            </a:effectRef>
-            <a:fontRef idx="minor">
-              <a:schemeClr val="tx1"/>
-            </a:fontRef>
-          </p:style>
-        </p:cxnSp>
-        <p:cxnSp>
-          <p:nvCxnSpPr>
-            <p:cNvPr id="83" name="直線接點 82"/>
-            <p:cNvCxnSpPr/>
-            <p:nvPr/>
-          </p:nvCxnSpPr>
-          <p:spPr>
-            <a:xfrm flipH="1" flipV="1">
-              <a:off x="5559634" y="3038602"/>
-              <a:ext cx="1209426" cy="858572"/>
-            </a:xfrm>
-            <a:prstGeom prst="line">
-              <a:avLst/>
-            </a:prstGeom>
-            <a:ln w="76200">
-              <a:solidFill>
-                <a:schemeClr val="tx1">
-                  <a:lumMod val="50000"/>
-                  <a:lumOff val="50000"/>
+              <a:ln>
+                <a:noFill/>
+              </a:ln>
+              <a:effectLst/>
+            </p:spPr>
+            <p:style>
+              <a:lnRef idx="2">
+                <a:schemeClr val="accent1">
+                  <a:shade val="50000"/>
                 </a:schemeClr>
-              </a:solidFill>
-            </a:ln>
-          </p:spPr>
-          <p:style>
-            <a:lnRef idx="1">
-              <a:schemeClr val="accent1"/>
-            </a:lnRef>
-            <a:fillRef idx="0">
-              <a:schemeClr val="accent1"/>
-            </a:fillRef>
-            <a:effectRef idx="0">
-              <a:schemeClr val="accent1"/>
-            </a:effectRef>
-            <a:fontRef idx="minor">
-              <a:schemeClr val="tx1"/>
-            </a:fontRef>
-          </p:style>
-        </p:cxnSp>
-        <p:cxnSp>
-          <p:nvCxnSpPr>
-            <p:cNvPr id="86" name="直線接點 85"/>
-            <p:cNvCxnSpPr/>
-            <p:nvPr/>
-          </p:nvCxnSpPr>
-          <p:spPr>
-            <a:xfrm flipH="1" flipV="1">
-              <a:off x="5559634" y="3038601"/>
-              <a:ext cx="728592" cy="2084918"/>
-            </a:xfrm>
-            <a:prstGeom prst="line">
-              <a:avLst/>
-            </a:prstGeom>
-            <a:ln w="76200">
-              <a:solidFill>
-                <a:schemeClr val="tx1">
-                  <a:lumMod val="50000"/>
-                  <a:lumOff val="50000"/>
-                </a:schemeClr>
-              </a:solidFill>
-            </a:ln>
-          </p:spPr>
-          <p:style>
-            <a:lnRef idx="1">
-              <a:schemeClr val="accent1"/>
-            </a:lnRef>
-            <a:fillRef idx="0">
-              <a:schemeClr val="accent1"/>
-            </a:fillRef>
-            <a:effectRef idx="0">
-              <a:schemeClr val="accent1"/>
-            </a:effectRef>
-            <a:fontRef idx="minor">
-              <a:schemeClr val="tx1"/>
-            </a:fontRef>
-          </p:style>
-        </p:cxnSp>
+              </a:lnRef>
+              <a:fillRef idx="1">
+                <a:schemeClr val="accent1"/>
+              </a:fillRef>
+              <a:effectRef idx="0">
+                <a:schemeClr val="accent1"/>
+              </a:effectRef>
+              <a:fontRef idx="minor">
+                <a:schemeClr val="lt1"/>
+              </a:fontRef>
+            </p:style>
+            <p:txBody>
+              <a:bodyPr rtlCol="0" anchor="ctr"/>
+              <a:lstStyle/>
+              <a:p>
+                <a:pPr algn="ctr"/>
+                <a:r>
+                  <a:rPr lang="en-US" altLang="zh-TW" sz="2400" dirty="0" smtClean="0">
+                    <a:latin typeface="Menlo" panose="020B0609030804020204" pitchFamily="49" charset="0"/>
+                    <a:cs typeface="Menlo" panose="020B0609030804020204" pitchFamily="49" charset="0"/>
+                  </a:rPr>
+                  <a:t>2</a:t>
+                </a:r>
+                <a:endParaRPr lang="zh-TW" altLang="en-US" sz="2400" dirty="0">
+                  <a:latin typeface="Menlo" panose="020B0609030804020204" pitchFamily="49" charset="0"/>
+                  <a:cs typeface="Menlo" panose="020B0609030804020204" pitchFamily="49" charset="0"/>
+                </a:endParaRPr>
+              </a:p>
+            </p:txBody>
+          </p:sp>
+        </p:grpSp>
         <p:sp>
           <p:nvSpPr>
-            <p:cNvPr id="6" name="橢圓 5"/>
-            <p:cNvSpPr/>
+            <p:cNvPr id="2" name="文字方塊 1"/>
+            <p:cNvSpPr txBox="1"/>
             <p:nvPr/>
           </p:nvSpPr>
           <p:spPr>
             <a:xfrm>
-              <a:off x="5242489" y="749311"/>
-              <a:ext cx="546671" cy="535100"/>
+              <a:off x="4469440" y="1037867"/>
+              <a:ext cx="287867" cy="323165"/>
             </a:xfrm>
-            <a:prstGeom prst="ellipse">
+            <a:prstGeom prst="rect">
               <a:avLst/>
             </a:prstGeom>
-            <a:solidFill>
-              <a:schemeClr val="tx1">
-                <a:lumMod val="75000"/>
-                <a:lumOff val="25000"/>
-              </a:schemeClr>
-            </a:solidFill>
-            <a:ln>
-              <a:noFill/>
-            </a:ln>
-            <a:effectLst/>
+            <a:noFill/>
           </p:spPr>
-          <p:style>
-            <a:lnRef idx="2">
-              <a:schemeClr val="accent1">
-                <a:shade val="50000"/>
-              </a:schemeClr>
-            </a:lnRef>
-            <a:fillRef idx="1">
-              <a:schemeClr val="accent1"/>
-            </a:fillRef>
-            <a:effectRef idx="0">
-              <a:schemeClr val="accent1"/>
-            </a:effectRef>
-            <a:fontRef idx="minor">
-              <a:schemeClr val="lt1"/>
-            </a:fontRef>
-          </p:style>
           <p:txBody>
-            <a:bodyPr rtlCol="0" anchor="ctr"/>
+            <a:bodyPr wrap="square" rtlCol="0">
+              <a:spAutoFit/>
+            </a:bodyPr>
             <a:lstStyle/>
             <a:p>
-              <a:pPr algn="ctr"/>
               <a:r>
-                <a:rPr lang="en-US" altLang="zh-TW" sz="2400" dirty="0" smtClean="0">
+                <a:rPr lang="en-US" altLang="zh-TW" sz="1500" b="1" u="sng" dirty="0" smtClean="0">
+                  <a:solidFill>
+                    <a:srgbClr val="005FEA"/>
+                  </a:solidFill>
                   <a:latin typeface="Menlo" panose="020B0609030804020204" pitchFamily="49" charset="0"/>
+                  <a:ea typeface="Menlo" panose="020B0609030804020204" pitchFamily="49" charset="0"/>
                   <a:cs typeface="Menlo" panose="020B0609030804020204" pitchFamily="49" charset="0"/>
                 </a:rPr>
                 <a:t>0</a:t>
               </a:r>
-              <a:endParaRPr lang="zh-TW" altLang="en-US" sz="2400" dirty="0">
+              <a:endParaRPr lang="zh-TW" altLang="en-US" sz="1500" b="1" u="sng" dirty="0">
+                <a:solidFill>
+                  <a:srgbClr val="005FEA"/>
+                </a:solidFill>
                 <a:latin typeface="Menlo" panose="020B0609030804020204" pitchFamily="49" charset="0"/>
                 <a:cs typeface="Menlo" panose="020B0609030804020204" pitchFamily="49" charset="0"/>
               </a:endParaRPr>
@@ -11584,58 +12242,41 @@
         </p:sp>
         <p:sp>
           <p:nvSpPr>
-            <p:cNvPr id="10" name="橢圓 9"/>
-            <p:cNvSpPr/>
+            <p:cNvPr id="49" name="文字方塊 48"/>
+            <p:cNvSpPr txBox="1"/>
             <p:nvPr/>
           </p:nvSpPr>
           <p:spPr>
             <a:xfrm>
-              <a:off x="4389696" y="1638083"/>
-              <a:ext cx="546671" cy="535100"/>
+              <a:off x="4472958" y="2089780"/>
+              <a:ext cx="287867" cy="323165"/>
             </a:xfrm>
-            <a:prstGeom prst="ellipse">
+            <a:prstGeom prst="rect">
               <a:avLst/>
             </a:prstGeom>
-            <a:solidFill>
-              <a:schemeClr val="tx1">
-                <a:lumMod val="75000"/>
-                <a:lumOff val="25000"/>
-              </a:schemeClr>
-            </a:solidFill>
-            <a:ln>
-              <a:noFill/>
-            </a:ln>
-            <a:effectLst/>
+            <a:noFill/>
           </p:spPr>
-          <p:style>
-            <a:lnRef idx="2">
-              <a:schemeClr val="accent1">
-                <a:shade val="50000"/>
-              </a:schemeClr>
-            </a:lnRef>
-            <a:fillRef idx="1">
-              <a:schemeClr val="accent1"/>
-            </a:fillRef>
-            <a:effectRef idx="0">
-              <a:schemeClr val="accent1"/>
-            </a:effectRef>
-            <a:fontRef idx="minor">
-              <a:schemeClr val="lt1"/>
-            </a:fontRef>
-          </p:style>
           <p:txBody>
-            <a:bodyPr rtlCol="0" anchor="ctr"/>
+            <a:bodyPr wrap="square" rtlCol="0">
+              <a:spAutoFit/>
+            </a:bodyPr>
             <a:lstStyle/>
             <a:p>
-              <a:pPr algn="ctr"/>
               <a:r>
-                <a:rPr lang="en-US" altLang="zh-TW" sz="2400" dirty="0" smtClean="0">
+                <a:rPr lang="en-US" altLang="zh-TW" sz="1500" b="1" u="sng" dirty="0" smtClean="0">
+                  <a:solidFill>
+                    <a:srgbClr val="005FEA"/>
+                  </a:solidFill>
                   <a:latin typeface="Menlo" panose="020B0609030804020204" pitchFamily="49" charset="0"/>
+                  <a:ea typeface="Menlo" panose="020B0609030804020204" pitchFamily="49" charset="0"/>
                   <a:cs typeface="Menlo" panose="020B0609030804020204" pitchFamily="49" charset="0"/>
                 </a:rPr>
                 <a:t>1</a:t>
               </a:r>
-              <a:endParaRPr lang="zh-TW" altLang="en-US" sz="2400" dirty="0">
+              <a:endParaRPr lang="zh-TW" altLang="en-US" sz="1500" b="1" u="sng" dirty="0">
+                <a:solidFill>
+                  <a:srgbClr val="005FEA"/>
+                </a:solidFill>
                 <a:latin typeface="Menlo" panose="020B0609030804020204" pitchFamily="49" charset="0"/>
                 <a:cs typeface="Menlo" panose="020B0609030804020204" pitchFamily="49" charset="0"/>
               </a:endParaRPr>
@@ -11644,58 +12285,41 @@
         </p:sp>
         <p:sp>
           <p:nvSpPr>
-            <p:cNvPr id="14" name="橢圓 13"/>
-            <p:cNvSpPr/>
+            <p:cNvPr id="50" name="文字方塊 49"/>
+            <p:cNvSpPr txBox="1"/>
             <p:nvPr/>
           </p:nvSpPr>
           <p:spPr>
             <a:xfrm>
-              <a:off x="6106305" y="1638083"/>
-              <a:ext cx="546671" cy="535100"/>
+              <a:off x="3758669" y="2988355"/>
+              <a:ext cx="287867" cy="323165"/>
             </a:xfrm>
-            <a:prstGeom prst="ellipse">
+            <a:prstGeom prst="rect">
               <a:avLst/>
             </a:prstGeom>
-            <a:solidFill>
-              <a:schemeClr val="tx1">
-                <a:lumMod val="75000"/>
-                <a:lumOff val="25000"/>
-              </a:schemeClr>
-            </a:solidFill>
-            <a:ln>
-              <a:noFill/>
-            </a:ln>
-            <a:effectLst/>
+            <a:noFill/>
           </p:spPr>
-          <p:style>
-            <a:lnRef idx="2">
-              <a:schemeClr val="accent1">
-                <a:shade val="50000"/>
-              </a:schemeClr>
-            </a:lnRef>
-            <a:fillRef idx="1">
-              <a:schemeClr val="accent1"/>
-            </a:fillRef>
-            <a:effectRef idx="0">
-              <a:schemeClr val="accent1"/>
-            </a:effectRef>
-            <a:fontRef idx="minor">
-              <a:schemeClr val="lt1"/>
-            </a:fontRef>
-          </p:style>
           <p:txBody>
-            <a:bodyPr rtlCol="0" anchor="ctr"/>
+            <a:bodyPr wrap="square" rtlCol="0">
+              <a:spAutoFit/>
+            </a:bodyPr>
             <a:lstStyle/>
             <a:p>
-              <a:pPr algn="ctr"/>
               <a:r>
-                <a:rPr lang="en-US" altLang="zh-TW" sz="2400" dirty="0" smtClean="0">
+                <a:rPr lang="en-US" altLang="zh-TW" sz="1500" b="1" u="sng" dirty="0" smtClean="0">
+                  <a:solidFill>
+                    <a:srgbClr val="005FEA"/>
+                  </a:solidFill>
                   <a:latin typeface="Menlo" panose="020B0609030804020204" pitchFamily="49" charset="0"/>
+                  <a:ea typeface="Menlo" panose="020B0609030804020204" pitchFamily="49" charset="0"/>
                   <a:cs typeface="Menlo" panose="020B0609030804020204" pitchFamily="49" charset="0"/>
                 </a:rPr>
                 <a:t>2</a:t>
               </a:r>
-              <a:endParaRPr lang="zh-TW" altLang="en-US" sz="2400" dirty="0">
+              <a:endParaRPr lang="zh-TW" altLang="en-US" sz="1500" b="1" u="sng" dirty="0">
+                <a:solidFill>
+                  <a:srgbClr val="005FEA"/>
+                </a:solidFill>
                 <a:latin typeface="Menlo" panose="020B0609030804020204" pitchFamily="49" charset="0"/>
                 <a:cs typeface="Menlo" panose="020B0609030804020204" pitchFamily="49" charset="0"/>
               </a:endParaRPr>
@@ -11704,58 +12328,41 @@
         </p:sp>
         <p:sp>
           <p:nvSpPr>
-            <p:cNvPr id="15" name="橢圓 14"/>
-            <p:cNvSpPr/>
+            <p:cNvPr id="51" name="文字方塊 50"/>
+            <p:cNvSpPr txBox="1"/>
             <p:nvPr/>
           </p:nvSpPr>
           <p:spPr>
             <a:xfrm>
-              <a:off x="3625137" y="2496656"/>
-              <a:ext cx="546671" cy="535100"/>
+              <a:off x="4524898" y="2993642"/>
+              <a:ext cx="287867" cy="323165"/>
             </a:xfrm>
-            <a:prstGeom prst="ellipse">
+            <a:prstGeom prst="rect">
               <a:avLst/>
             </a:prstGeom>
-            <a:solidFill>
-              <a:schemeClr val="tx1">
-                <a:lumMod val="75000"/>
-                <a:lumOff val="25000"/>
-              </a:schemeClr>
-            </a:solidFill>
-            <a:ln>
-              <a:noFill/>
-            </a:ln>
-            <a:effectLst/>
+            <a:noFill/>
           </p:spPr>
-          <p:style>
-            <a:lnRef idx="2">
-              <a:schemeClr val="accent1">
-                <a:shade val="50000"/>
-              </a:schemeClr>
-            </a:lnRef>
-            <a:fillRef idx="1">
-              <a:schemeClr val="accent1"/>
-            </a:fillRef>
-            <a:effectRef idx="0">
-              <a:schemeClr val="accent1"/>
-            </a:effectRef>
-            <a:fontRef idx="minor">
-              <a:schemeClr val="lt1"/>
-            </a:fontRef>
-          </p:style>
           <p:txBody>
-            <a:bodyPr rtlCol="0" anchor="ctr"/>
+            <a:bodyPr wrap="square" rtlCol="0">
+              <a:spAutoFit/>
+            </a:bodyPr>
             <a:lstStyle/>
             <a:p>
-              <a:pPr algn="ctr"/>
               <a:r>
-                <a:rPr lang="en-US" altLang="zh-TW" sz="2400" dirty="0">
+                <a:rPr lang="en-US" altLang="zh-TW" sz="1500" b="1" u="sng" dirty="0" smtClean="0">
+                  <a:solidFill>
+                    <a:srgbClr val="158D05"/>
+                  </a:solidFill>
                   <a:latin typeface="Menlo" panose="020B0609030804020204" pitchFamily="49" charset="0"/>
+                  <a:ea typeface="Menlo" panose="020B0609030804020204" pitchFamily="49" charset="0"/>
                   <a:cs typeface="Menlo" panose="020B0609030804020204" pitchFamily="49" charset="0"/>
                 </a:rPr>
-                <a:t>9</a:t>
+                <a:t>3</a:t>
               </a:r>
-              <a:endParaRPr lang="zh-TW" altLang="en-US" sz="2400" dirty="0">
+              <a:endParaRPr lang="zh-TW" altLang="en-US" sz="1500" b="1" u="sng" dirty="0">
+                <a:solidFill>
+                  <a:srgbClr val="158D05"/>
+                </a:solidFill>
                 <a:latin typeface="Menlo" panose="020B0609030804020204" pitchFamily="49" charset="0"/>
                 <a:cs typeface="Menlo" panose="020B0609030804020204" pitchFamily="49" charset="0"/>
               </a:endParaRPr>
@@ -11764,58 +12371,41 @@
         </p:sp>
         <p:sp>
           <p:nvSpPr>
-            <p:cNvPr id="16" name="橢圓 15"/>
-            <p:cNvSpPr/>
+            <p:cNvPr id="53" name="文字方塊 52"/>
+            <p:cNvSpPr txBox="1"/>
             <p:nvPr/>
           </p:nvSpPr>
           <p:spPr>
             <a:xfrm>
-              <a:off x="5297172" y="2764206"/>
-              <a:ext cx="546671" cy="535100"/>
+              <a:off x="5204995" y="2965518"/>
+              <a:ext cx="287867" cy="323165"/>
             </a:xfrm>
-            <a:prstGeom prst="ellipse">
+            <a:prstGeom prst="rect">
               <a:avLst/>
             </a:prstGeom>
-            <a:solidFill>
-              <a:schemeClr val="tx1">
-                <a:lumMod val="75000"/>
-                <a:lumOff val="25000"/>
-              </a:schemeClr>
-            </a:solidFill>
-            <a:ln>
-              <a:noFill/>
-            </a:ln>
-            <a:effectLst/>
+            <a:noFill/>
           </p:spPr>
-          <p:style>
-            <a:lnRef idx="2">
-              <a:schemeClr val="accent1">
-                <a:shade val="50000"/>
-              </a:schemeClr>
-            </a:lnRef>
-            <a:fillRef idx="1">
-              <a:schemeClr val="accent1"/>
-            </a:fillRef>
-            <a:effectRef idx="0">
-              <a:schemeClr val="accent1"/>
-            </a:effectRef>
-            <a:fontRef idx="minor">
-              <a:schemeClr val="lt1"/>
-            </a:fontRef>
-          </p:style>
           <p:txBody>
-            <a:bodyPr rtlCol="0" anchor="ctr"/>
+            <a:bodyPr wrap="square" rtlCol="0">
+              <a:spAutoFit/>
+            </a:bodyPr>
             <a:lstStyle/>
             <a:p>
-              <a:pPr algn="ctr"/>
               <a:r>
-                <a:rPr lang="en-US" altLang="zh-TW" sz="2400" dirty="0" smtClean="0">
+                <a:rPr lang="en-US" altLang="zh-TW" sz="1500" b="1" u="sng" dirty="0" smtClean="0">
+                  <a:solidFill>
+                    <a:srgbClr val="005FEA"/>
+                  </a:solidFill>
                   <a:latin typeface="Menlo" panose="020B0609030804020204" pitchFamily="49" charset="0"/>
+                  <a:ea typeface="Menlo" panose="020B0609030804020204" pitchFamily="49" charset="0"/>
                   <a:cs typeface="Menlo" panose="020B0609030804020204" pitchFamily="49" charset="0"/>
                 </a:rPr>
                 <a:t>4</a:t>
               </a:r>
-              <a:endParaRPr lang="zh-TW" altLang="en-US" sz="2400" dirty="0">
+              <a:endParaRPr lang="zh-TW" altLang="en-US" sz="1500" b="1" u="sng" dirty="0">
+                <a:solidFill>
+                  <a:srgbClr val="005FEA"/>
+                </a:solidFill>
                 <a:latin typeface="Menlo" panose="020B0609030804020204" pitchFamily="49" charset="0"/>
                 <a:cs typeface="Menlo" panose="020B0609030804020204" pitchFamily="49" charset="0"/>
               </a:endParaRPr>
@@ -11824,58 +12414,41 @@
         </p:sp>
         <p:sp>
           <p:nvSpPr>
-            <p:cNvPr id="17" name="橢圓 16"/>
-            <p:cNvSpPr/>
+            <p:cNvPr id="54" name="文字方塊 53"/>
+            <p:cNvSpPr txBox="1"/>
             <p:nvPr/>
           </p:nvSpPr>
           <p:spPr>
             <a:xfrm>
-              <a:off x="6495725" y="3629624"/>
-              <a:ext cx="546671" cy="535100"/>
+              <a:off x="4358957" y="3862252"/>
+              <a:ext cx="287867" cy="323165"/>
             </a:xfrm>
-            <a:prstGeom prst="ellipse">
+            <a:prstGeom prst="rect">
               <a:avLst/>
             </a:prstGeom>
-            <a:solidFill>
-              <a:schemeClr val="tx1">
-                <a:lumMod val="75000"/>
-                <a:lumOff val="25000"/>
-              </a:schemeClr>
-            </a:solidFill>
-            <a:ln>
-              <a:noFill/>
-            </a:ln>
-            <a:effectLst/>
+            <a:noFill/>
           </p:spPr>
-          <p:style>
-            <a:lnRef idx="2">
-              <a:schemeClr val="accent1">
-                <a:shade val="50000"/>
-              </a:schemeClr>
-            </a:lnRef>
-            <a:fillRef idx="1">
-              <a:schemeClr val="accent1"/>
-            </a:fillRef>
-            <a:effectRef idx="0">
-              <a:schemeClr val="accent1"/>
-            </a:effectRef>
-            <a:fontRef idx="minor">
-              <a:schemeClr val="lt1"/>
-            </a:fontRef>
-          </p:style>
           <p:txBody>
-            <a:bodyPr rtlCol="0" anchor="ctr"/>
+            <a:bodyPr wrap="square" rtlCol="0">
+              <a:spAutoFit/>
+            </a:bodyPr>
             <a:lstStyle/>
             <a:p>
-              <a:pPr algn="ctr"/>
               <a:r>
-                <a:rPr lang="en-US" altLang="zh-TW" sz="2400" dirty="0" smtClean="0">
+                <a:rPr lang="en-US" altLang="zh-TW" sz="1500" b="1" u="sng" dirty="0" smtClean="0">
+                  <a:solidFill>
+                    <a:srgbClr val="005FEA"/>
+                  </a:solidFill>
                   <a:latin typeface="Menlo" panose="020B0609030804020204" pitchFamily="49" charset="0"/>
+                  <a:ea typeface="Menlo" panose="020B0609030804020204" pitchFamily="49" charset="0"/>
                   <a:cs typeface="Menlo" panose="020B0609030804020204" pitchFamily="49" charset="0"/>
                 </a:rPr>
-                <a:t>6</a:t>
+                <a:t>5</a:t>
               </a:r>
-              <a:endParaRPr lang="zh-TW" altLang="en-US" sz="2400" dirty="0">
+              <a:endParaRPr lang="zh-TW" altLang="en-US" sz="1500" b="1" u="sng" dirty="0">
+                <a:solidFill>
+                  <a:srgbClr val="005FEA"/>
+                </a:solidFill>
                 <a:latin typeface="Menlo" panose="020B0609030804020204" pitchFamily="49" charset="0"/>
                 <a:cs typeface="Menlo" panose="020B0609030804020204" pitchFamily="49" charset="0"/>
               </a:endParaRPr>
@@ -11884,58 +12457,41 @@
         </p:sp>
         <p:sp>
           <p:nvSpPr>
-            <p:cNvPr id="18" name="橢圓 17"/>
-            <p:cNvSpPr/>
+            <p:cNvPr id="56" name="文字方塊 55"/>
+            <p:cNvSpPr txBox="1"/>
             <p:nvPr/>
           </p:nvSpPr>
           <p:spPr>
             <a:xfrm>
-              <a:off x="6014891" y="4855969"/>
-              <a:ext cx="546671" cy="535100"/>
+              <a:off x="3774634" y="4755841"/>
+              <a:ext cx="287867" cy="323165"/>
             </a:xfrm>
-            <a:prstGeom prst="ellipse">
+            <a:prstGeom prst="rect">
               <a:avLst/>
             </a:prstGeom>
-            <a:solidFill>
-              <a:schemeClr val="tx1">
-                <a:lumMod val="75000"/>
-                <a:lumOff val="25000"/>
-              </a:schemeClr>
-            </a:solidFill>
-            <a:ln>
-              <a:noFill/>
-            </a:ln>
-            <a:effectLst/>
+            <a:noFill/>
           </p:spPr>
-          <p:style>
-            <a:lnRef idx="2">
-              <a:schemeClr val="accent1">
-                <a:shade val="50000"/>
-              </a:schemeClr>
-            </a:lnRef>
-            <a:fillRef idx="1">
-              <a:schemeClr val="accent1"/>
-            </a:fillRef>
-            <a:effectRef idx="0">
-              <a:schemeClr val="accent1"/>
-            </a:effectRef>
-            <a:fontRef idx="minor">
-              <a:schemeClr val="lt1"/>
-            </a:fontRef>
-          </p:style>
           <p:txBody>
-            <a:bodyPr rtlCol="0" anchor="ctr"/>
+            <a:bodyPr wrap="square" rtlCol="0">
+              <a:spAutoFit/>
+            </a:bodyPr>
             <a:lstStyle/>
             <a:p>
-              <a:pPr algn="ctr"/>
               <a:r>
-                <a:rPr lang="en-US" altLang="zh-TW" sz="2400" dirty="0" smtClean="0">
+                <a:rPr lang="en-US" altLang="zh-TW" sz="1500" b="1" u="sng" dirty="0" smtClean="0">
+                  <a:solidFill>
+                    <a:srgbClr val="005FEA"/>
+                  </a:solidFill>
                   <a:latin typeface="Menlo" panose="020B0609030804020204" pitchFamily="49" charset="0"/>
+                  <a:ea typeface="Menlo" panose="020B0609030804020204" pitchFamily="49" charset="0"/>
                   <a:cs typeface="Menlo" panose="020B0609030804020204" pitchFamily="49" charset="0"/>
                 </a:rPr>
-                <a:t>5</a:t>
+                <a:t>6</a:t>
               </a:r>
-              <a:endParaRPr lang="zh-TW" altLang="en-US" sz="2400" dirty="0">
+              <a:endParaRPr lang="zh-TW" altLang="en-US" sz="1500" b="1" u="sng" dirty="0">
+                <a:solidFill>
+                  <a:srgbClr val="005FEA"/>
+                </a:solidFill>
                 <a:latin typeface="Menlo" panose="020B0609030804020204" pitchFamily="49" charset="0"/>
                 <a:cs typeface="Menlo" panose="020B0609030804020204" pitchFamily="49" charset="0"/>
               </a:endParaRPr>
@@ -11944,58 +12500,41 @@
         </p:sp>
         <p:sp>
           <p:nvSpPr>
-            <p:cNvPr id="19" name="橢圓 18"/>
-            <p:cNvSpPr/>
+            <p:cNvPr id="57" name="文字方塊 56"/>
+            <p:cNvSpPr txBox="1"/>
             <p:nvPr/>
           </p:nvSpPr>
           <p:spPr>
             <a:xfrm>
-              <a:off x="4683997" y="4855969"/>
-              <a:ext cx="546671" cy="535100"/>
+              <a:off x="4557676" y="4747374"/>
+              <a:ext cx="287867" cy="323165"/>
             </a:xfrm>
-            <a:prstGeom prst="ellipse">
+            <a:prstGeom prst="rect">
               <a:avLst/>
             </a:prstGeom>
-            <a:solidFill>
-              <a:schemeClr val="tx1">
-                <a:lumMod val="75000"/>
-                <a:lumOff val="25000"/>
-              </a:schemeClr>
-            </a:solidFill>
-            <a:ln>
-              <a:noFill/>
-            </a:ln>
-            <a:effectLst/>
+            <a:noFill/>
           </p:spPr>
-          <p:style>
-            <a:lnRef idx="2">
-              <a:schemeClr val="accent1">
-                <a:shade val="50000"/>
-              </a:schemeClr>
-            </a:lnRef>
-            <a:fillRef idx="1">
-              <a:schemeClr val="accent1"/>
-            </a:fillRef>
-            <a:effectRef idx="0">
-              <a:schemeClr val="accent1"/>
-            </a:effectRef>
-            <a:fontRef idx="minor">
-              <a:schemeClr val="lt1"/>
-            </a:fontRef>
-          </p:style>
           <p:txBody>
-            <a:bodyPr rtlCol="0" anchor="ctr"/>
+            <a:bodyPr wrap="square" rtlCol="0">
+              <a:spAutoFit/>
+            </a:bodyPr>
             <a:lstStyle/>
             <a:p>
-              <a:pPr algn="ctr"/>
               <a:r>
-                <a:rPr lang="en-US" altLang="zh-TW" sz="2400" dirty="0">
+                <a:rPr lang="en-US" altLang="zh-TW" sz="1500" b="1" u="sng" dirty="0" smtClean="0">
+                  <a:solidFill>
+                    <a:srgbClr val="158D05"/>
+                  </a:solidFill>
                   <a:latin typeface="Menlo" panose="020B0609030804020204" pitchFamily="49" charset="0"/>
+                  <a:ea typeface="Menlo" panose="020B0609030804020204" pitchFamily="49" charset="0"/>
                   <a:cs typeface="Menlo" panose="020B0609030804020204" pitchFamily="49" charset="0"/>
                 </a:rPr>
                 <a:t>7</a:t>
               </a:r>
-              <a:endParaRPr lang="zh-TW" altLang="en-US" sz="2400" dirty="0">
+              <a:endParaRPr lang="zh-TW" altLang="en-US" sz="1500" b="1" u="sng" dirty="0">
+                <a:solidFill>
+                  <a:srgbClr val="158D05"/>
+                </a:solidFill>
                 <a:latin typeface="Menlo" panose="020B0609030804020204" pitchFamily="49" charset="0"/>
                 <a:cs typeface="Menlo" panose="020B0609030804020204" pitchFamily="49" charset="0"/>
               </a:endParaRPr>
@@ -12004,58 +12543,41 @@
         </p:sp>
         <p:sp>
           <p:nvSpPr>
-            <p:cNvPr id="20" name="橢圓 19"/>
-            <p:cNvSpPr/>
+            <p:cNvPr id="59" name="文字方塊 58"/>
+            <p:cNvSpPr txBox="1"/>
             <p:nvPr/>
           </p:nvSpPr>
           <p:spPr>
             <a:xfrm>
-              <a:off x="4250135" y="3629624"/>
-              <a:ext cx="546671" cy="535100"/>
+              <a:off x="5103240" y="3863858"/>
+              <a:ext cx="287867" cy="323165"/>
             </a:xfrm>
-            <a:prstGeom prst="ellipse">
+            <a:prstGeom prst="rect">
               <a:avLst/>
             </a:prstGeom>
-            <a:solidFill>
-              <a:schemeClr val="tx1">
-                <a:lumMod val="75000"/>
-                <a:lumOff val="25000"/>
-              </a:schemeClr>
-            </a:solidFill>
-            <a:ln>
-              <a:noFill/>
-            </a:ln>
-            <a:effectLst/>
+            <a:noFill/>
           </p:spPr>
-          <p:style>
-            <a:lnRef idx="2">
-              <a:schemeClr val="accent1">
-                <a:shade val="50000"/>
-              </a:schemeClr>
-            </a:lnRef>
-            <a:fillRef idx="1">
-              <a:schemeClr val="accent1"/>
-            </a:fillRef>
-            <a:effectRef idx="0">
-              <a:schemeClr val="accent1"/>
-            </a:effectRef>
-            <a:fontRef idx="minor">
-              <a:schemeClr val="lt1"/>
-            </a:fontRef>
-          </p:style>
           <p:txBody>
-            <a:bodyPr rtlCol="0" anchor="ctr"/>
+            <a:bodyPr wrap="square" rtlCol="0">
+              <a:spAutoFit/>
+            </a:bodyPr>
             <a:lstStyle/>
             <a:p>
-              <a:pPr algn="ctr"/>
               <a:r>
-                <a:rPr lang="en-US" altLang="zh-TW" sz="2400" dirty="0" smtClean="0">
+                <a:rPr lang="en-US" altLang="zh-TW" sz="1500" b="1" u="sng" dirty="0">
+                  <a:solidFill>
+                    <a:srgbClr val="158D05"/>
+                  </a:solidFill>
                   <a:latin typeface="Menlo" panose="020B0609030804020204" pitchFamily="49" charset="0"/>
+                  <a:ea typeface="Menlo" panose="020B0609030804020204" pitchFamily="49" charset="0"/>
                   <a:cs typeface="Menlo" panose="020B0609030804020204" pitchFamily="49" charset="0"/>
                 </a:rPr>
                 <a:t>8</a:t>
               </a:r>
-              <a:endParaRPr lang="zh-TW" altLang="en-US" sz="2400" dirty="0">
+              <a:endParaRPr lang="zh-TW" altLang="en-US" sz="1500" b="1" u="sng" dirty="0">
+                <a:solidFill>
+                  <a:srgbClr val="158D05"/>
+                </a:solidFill>
                 <a:latin typeface="Menlo" panose="020B0609030804020204" pitchFamily="49" charset="0"/>
                 <a:cs typeface="Menlo" panose="020B0609030804020204" pitchFamily="49" charset="0"/>
               </a:endParaRPr>
@@ -12064,613 +12586,41 @@
         </p:sp>
         <p:sp>
           <p:nvSpPr>
-            <p:cNvPr id="22" name="橢圓 21"/>
-            <p:cNvSpPr/>
+            <p:cNvPr id="60" name="文字方塊 59"/>
+            <p:cNvSpPr txBox="1"/>
             <p:nvPr/>
           </p:nvSpPr>
           <p:spPr>
             <a:xfrm>
-              <a:off x="6969208" y="2446091"/>
-              <a:ext cx="546671" cy="535100"/>
+              <a:off x="5726727" y="3856891"/>
+              <a:ext cx="287867" cy="323165"/>
             </a:xfrm>
-            <a:prstGeom prst="ellipse">
+            <a:prstGeom prst="rect">
               <a:avLst/>
             </a:prstGeom>
-            <a:solidFill>
-              <a:schemeClr val="tx1">
-                <a:lumMod val="75000"/>
-                <a:lumOff val="25000"/>
-              </a:schemeClr>
-            </a:solidFill>
-            <a:ln>
-              <a:noFill/>
-            </a:ln>
-            <a:effectLst/>
+            <a:noFill/>
           </p:spPr>
-          <p:style>
-            <a:lnRef idx="2">
-              <a:schemeClr val="accent1">
-                <a:shade val="50000"/>
-              </a:schemeClr>
-            </a:lnRef>
-            <a:fillRef idx="1">
-              <a:schemeClr val="accent1"/>
-            </a:fillRef>
-            <a:effectRef idx="0">
-              <a:schemeClr val="accent1"/>
-            </a:effectRef>
-            <a:fontRef idx="minor">
-              <a:schemeClr val="lt1"/>
-            </a:fontRef>
-          </p:style>
           <p:txBody>
-            <a:bodyPr rtlCol="0" anchor="ctr"/>
+            <a:bodyPr wrap="square" rtlCol="0">
+              <a:spAutoFit/>
+            </a:bodyPr>
             <a:lstStyle/>
             <a:p>
-              <a:pPr algn="ctr"/>
               <a:r>
-                <a:rPr lang="en-US" altLang="zh-TW" sz="2400" dirty="0" smtClean="0">
+                <a:rPr lang="en-US" altLang="zh-TW" sz="1500" b="1" u="sng" dirty="0" smtClean="0">
+                  <a:solidFill>
+                    <a:srgbClr val="005FEA"/>
+                  </a:solidFill>
                   <a:latin typeface="Menlo" panose="020B0609030804020204" pitchFamily="49" charset="0"/>
+                  <a:ea typeface="Menlo" panose="020B0609030804020204" pitchFamily="49" charset="0"/>
                   <a:cs typeface="Menlo" panose="020B0609030804020204" pitchFamily="49" charset="0"/>
                 </a:rPr>
-                <a:t>3</a:t>
+                <a:t>9</a:t>
               </a:r>
-              <a:endParaRPr lang="zh-TW" altLang="en-US" sz="2400" dirty="0">
-                <a:latin typeface="Menlo" panose="020B0609030804020204" pitchFamily="49" charset="0"/>
-                <a:cs typeface="Menlo" panose="020B0609030804020204" pitchFamily="49" charset="0"/>
-              </a:endParaRPr>
-            </a:p>
-          </p:txBody>
-        </p:sp>
-      </p:grpSp>
-      <p:grpSp>
-        <p:nvGrpSpPr>
-          <p:cNvPr id="115" name="群組 114"/>
-          <p:cNvGrpSpPr/>
-          <p:nvPr/>
-        </p:nvGrpSpPr>
-        <p:grpSpPr>
-          <a:xfrm>
-            <a:off x="6711444" y="921181"/>
-            <a:ext cx="3712879" cy="5046751"/>
-            <a:chOff x="6840746" y="528480"/>
-            <a:chExt cx="3712879" cy="5046751"/>
-          </a:xfrm>
-        </p:grpSpPr>
-        <p:sp>
-          <p:nvSpPr>
-            <p:cNvPr id="116" name="弧形 115"/>
-            <p:cNvSpPr/>
-            <p:nvPr/>
-          </p:nvSpPr>
-          <p:spPr>
-            <a:xfrm rot="21390419">
-              <a:off x="8370202" y="2430663"/>
-              <a:ext cx="2183423" cy="2895653"/>
-            </a:xfrm>
-            <a:prstGeom prst="arc">
-              <a:avLst>
-                <a:gd name="adj1" fmla="val 15237009"/>
-                <a:gd name="adj2" fmla="val 5394745"/>
-              </a:avLst>
-            </a:prstGeom>
-            <a:ln w="76200">
-              <a:solidFill>
-                <a:srgbClr val="C00000"/>
-              </a:solidFill>
-            </a:ln>
-          </p:spPr>
-          <p:style>
-            <a:lnRef idx="1">
-              <a:schemeClr val="accent1"/>
-            </a:lnRef>
-            <a:fillRef idx="0">
-              <a:schemeClr val="accent1"/>
-            </a:fillRef>
-            <a:effectRef idx="0">
-              <a:schemeClr val="accent1"/>
-            </a:effectRef>
-            <a:fontRef idx="minor">
-              <a:schemeClr val="tx1"/>
-            </a:fontRef>
-          </p:style>
-          <p:txBody>
-            <a:bodyPr rtlCol="0" anchor="ctr"/>
-            <a:lstStyle/>
-            <a:p>
-              <a:pPr algn="ctr"/>
-              <a:endParaRPr lang="zh-TW" altLang="en-US"/>
-            </a:p>
-          </p:txBody>
-        </p:sp>
-        <p:sp>
-          <p:nvSpPr>
-            <p:cNvPr id="117" name="弧形 116"/>
-            <p:cNvSpPr/>
-            <p:nvPr/>
-          </p:nvSpPr>
-          <p:spPr>
-            <a:xfrm rot="20858719">
-              <a:off x="8472209" y="2572120"/>
-              <a:ext cx="1655086" cy="2047101"/>
-            </a:xfrm>
-            <a:prstGeom prst="arc">
-              <a:avLst>
-                <a:gd name="adj1" fmla="val 16280781"/>
-                <a:gd name="adj2" fmla="val 3690667"/>
-              </a:avLst>
-            </a:prstGeom>
-            <a:ln w="76200">
-              <a:solidFill>
-                <a:srgbClr val="C00000"/>
-              </a:solidFill>
-            </a:ln>
-          </p:spPr>
-          <p:style>
-            <a:lnRef idx="1">
-              <a:schemeClr val="accent1"/>
-            </a:lnRef>
-            <a:fillRef idx="0">
-              <a:schemeClr val="accent1"/>
-            </a:fillRef>
-            <a:effectRef idx="0">
-              <a:schemeClr val="accent1"/>
-            </a:effectRef>
-            <a:fontRef idx="minor">
-              <a:schemeClr val="tx1"/>
-            </a:fontRef>
-          </p:style>
-          <p:txBody>
-            <a:bodyPr rtlCol="0" anchor="ctr"/>
-            <a:lstStyle/>
-            <a:p>
-              <a:pPr algn="ctr"/>
-              <a:endParaRPr lang="zh-TW" altLang="en-US"/>
-            </a:p>
-          </p:txBody>
-        </p:sp>
-        <p:sp>
-          <p:nvSpPr>
-            <p:cNvPr id="118" name="弧形 117"/>
-            <p:cNvSpPr/>
-            <p:nvPr/>
-          </p:nvSpPr>
-          <p:spPr>
-            <a:xfrm flipH="1">
-              <a:off x="6840746" y="796029"/>
-              <a:ext cx="2644771" cy="2662809"/>
-            </a:xfrm>
-            <a:prstGeom prst="arc">
-              <a:avLst>
-                <a:gd name="adj1" fmla="val 16280781"/>
-                <a:gd name="adj2" fmla="val 5328389"/>
-              </a:avLst>
-            </a:prstGeom>
-            <a:ln w="76200">
-              <a:solidFill>
-                <a:srgbClr val="C00000"/>
-              </a:solidFill>
-            </a:ln>
-          </p:spPr>
-          <p:style>
-            <a:lnRef idx="1">
-              <a:schemeClr val="accent1"/>
-            </a:lnRef>
-            <a:fillRef idx="0">
-              <a:schemeClr val="accent1"/>
-            </a:fillRef>
-            <a:effectRef idx="0">
-              <a:schemeClr val="accent1"/>
-            </a:effectRef>
-            <a:fontRef idx="minor">
-              <a:schemeClr val="tx1"/>
-            </a:fontRef>
-          </p:style>
-          <p:txBody>
-            <a:bodyPr rtlCol="0" anchor="ctr"/>
-            <a:lstStyle/>
-            <a:p>
-              <a:pPr algn="ctr"/>
-              <a:endParaRPr lang="zh-TW" altLang="en-US"/>
-            </a:p>
-          </p:txBody>
-        </p:sp>
-        <p:cxnSp>
-          <p:nvCxnSpPr>
-            <p:cNvPr id="119" name="直線接點 118"/>
-            <p:cNvCxnSpPr/>
-            <p:nvPr/>
-          </p:nvCxnSpPr>
-          <p:spPr>
-            <a:xfrm flipH="1">
-              <a:off x="7524975" y="1680025"/>
-              <a:ext cx="694942" cy="880029"/>
-            </a:xfrm>
-            <a:prstGeom prst="line">
-              <a:avLst/>
-            </a:prstGeom>
-            <a:ln w="76200">
-              <a:solidFill>
-                <a:schemeClr val="tx1">
-                  <a:lumMod val="50000"/>
-                  <a:lumOff val="50000"/>
-                </a:schemeClr>
-              </a:solidFill>
-            </a:ln>
-          </p:spPr>
-          <p:style>
-            <a:lnRef idx="1">
-              <a:schemeClr val="accent1"/>
-            </a:lnRef>
-            <a:fillRef idx="0">
-              <a:schemeClr val="accent1"/>
-            </a:fillRef>
-            <a:effectRef idx="0">
-              <a:schemeClr val="accent1"/>
-            </a:effectRef>
-            <a:fontRef idx="minor">
-              <a:schemeClr val="tx1"/>
-            </a:fontRef>
-          </p:style>
-        </p:cxnSp>
-        <p:cxnSp>
-          <p:nvCxnSpPr>
-            <p:cNvPr id="120" name="直線接點 119"/>
-            <p:cNvCxnSpPr/>
-            <p:nvPr/>
-          </p:nvCxnSpPr>
-          <p:spPr>
-            <a:xfrm>
-              <a:off x="8219917" y="1668879"/>
-              <a:ext cx="746145" cy="891175"/>
-            </a:xfrm>
-            <a:prstGeom prst="line">
-              <a:avLst/>
-            </a:prstGeom>
-            <a:ln w="76200">
-              <a:solidFill>
-                <a:schemeClr val="tx1">
-                  <a:lumMod val="50000"/>
-                  <a:lumOff val="50000"/>
-                </a:schemeClr>
-              </a:solidFill>
-            </a:ln>
-          </p:spPr>
-          <p:style>
-            <a:lnRef idx="1">
-              <a:schemeClr val="accent1"/>
-            </a:lnRef>
-            <a:fillRef idx="0">
-              <a:schemeClr val="accent1"/>
-            </a:fillRef>
-            <a:effectRef idx="0">
-              <a:schemeClr val="accent1"/>
-            </a:effectRef>
-            <a:fontRef idx="minor">
-              <a:schemeClr val="tx1"/>
-            </a:fontRef>
-          </p:style>
-        </p:cxnSp>
-        <p:cxnSp>
-          <p:nvCxnSpPr>
-            <p:cNvPr id="121" name="直線接點 120"/>
-            <p:cNvCxnSpPr/>
-            <p:nvPr/>
-          </p:nvCxnSpPr>
-          <p:spPr>
-            <a:xfrm flipV="1">
-              <a:off x="8111427" y="2560054"/>
-              <a:ext cx="854635" cy="872849"/>
-            </a:xfrm>
-            <a:prstGeom prst="line">
-              <a:avLst/>
-            </a:prstGeom>
-            <a:ln w="76200">
-              <a:solidFill>
-                <a:schemeClr val="tx1">
-                  <a:lumMod val="50000"/>
-                  <a:lumOff val="50000"/>
-                </a:schemeClr>
-              </a:solidFill>
-            </a:ln>
-          </p:spPr>
-          <p:style>
-            <a:lnRef idx="1">
-              <a:schemeClr val="accent1"/>
-            </a:lnRef>
-            <a:fillRef idx="0">
-              <a:schemeClr val="accent1"/>
-            </a:fillRef>
-            <a:effectRef idx="0">
-              <a:schemeClr val="accent1"/>
-            </a:effectRef>
-            <a:fontRef idx="minor">
-              <a:schemeClr val="tx1"/>
-            </a:fontRef>
-          </p:style>
-        </p:cxnSp>
-        <p:cxnSp>
-          <p:nvCxnSpPr>
-            <p:cNvPr id="122" name="直線接點 121"/>
-            <p:cNvCxnSpPr/>
-            <p:nvPr/>
-          </p:nvCxnSpPr>
-          <p:spPr>
-            <a:xfrm flipH="1" flipV="1">
-              <a:off x="8966062" y="2560054"/>
-              <a:ext cx="523830" cy="887529"/>
-            </a:xfrm>
-            <a:prstGeom prst="line">
-              <a:avLst/>
-            </a:prstGeom>
-            <a:ln w="76200">
-              <a:solidFill>
-                <a:schemeClr val="tx1">
-                  <a:lumMod val="50000"/>
-                  <a:lumOff val="50000"/>
-                </a:schemeClr>
-              </a:solidFill>
-            </a:ln>
-          </p:spPr>
-          <p:style>
-            <a:lnRef idx="1">
-              <a:schemeClr val="accent1"/>
-            </a:lnRef>
-            <a:fillRef idx="0">
-              <a:schemeClr val="accent1"/>
-            </a:fillRef>
-            <a:effectRef idx="0">
-              <a:schemeClr val="accent1"/>
-            </a:effectRef>
-            <a:fontRef idx="minor">
-              <a:schemeClr val="tx1"/>
-            </a:fontRef>
-          </p:style>
-        </p:cxnSp>
-        <p:cxnSp>
-          <p:nvCxnSpPr>
-            <p:cNvPr id="123" name="直線接點 122"/>
-            <p:cNvCxnSpPr/>
-            <p:nvPr/>
-          </p:nvCxnSpPr>
-          <p:spPr>
-            <a:xfrm flipV="1">
-              <a:off x="7689075" y="3432903"/>
-              <a:ext cx="422351" cy="891175"/>
-            </a:xfrm>
-            <a:prstGeom prst="line">
-              <a:avLst/>
-            </a:prstGeom>
-            <a:ln w="76200">
-              <a:solidFill>
-                <a:schemeClr val="tx1">
-                  <a:lumMod val="50000"/>
-                  <a:lumOff val="50000"/>
-                </a:schemeClr>
-              </a:solidFill>
-            </a:ln>
-          </p:spPr>
-          <p:style>
-            <a:lnRef idx="1">
-              <a:schemeClr val="accent1"/>
-            </a:lnRef>
-            <a:fillRef idx="0">
-              <a:schemeClr val="accent1"/>
-            </a:fillRef>
-            <a:effectRef idx="0">
-              <a:schemeClr val="accent1"/>
-            </a:effectRef>
-            <a:fontRef idx="minor">
-              <a:schemeClr val="tx1"/>
-            </a:fontRef>
-          </p:style>
-        </p:cxnSp>
-        <p:cxnSp>
-          <p:nvCxnSpPr>
-            <p:cNvPr id="124" name="直線接點 123"/>
-            <p:cNvCxnSpPr/>
-            <p:nvPr/>
-          </p:nvCxnSpPr>
-          <p:spPr>
-            <a:xfrm flipV="1">
-              <a:off x="8861237" y="3440083"/>
-              <a:ext cx="628654" cy="883995"/>
-            </a:xfrm>
-            <a:prstGeom prst="line">
-              <a:avLst/>
-            </a:prstGeom>
-            <a:ln w="76200">
-              <a:solidFill>
-                <a:schemeClr val="tx1">
-                  <a:lumMod val="50000"/>
-                  <a:lumOff val="50000"/>
-                </a:schemeClr>
-              </a:solidFill>
-            </a:ln>
-          </p:spPr>
-          <p:style>
-            <a:lnRef idx="1">
-              <a:schemeClr val="accent1"/>
-            </a:lnRef>
-            <a:fillRef idx="0">
-              <a:schemeClr val="accent1"/>
-            </a:fillRef>
-            <a:effectRef idx="0">
-              <a:schemeClr val="accent1"/>
-            </a:effectRef>
-            <a:fontRef idx="minor">
-              <a:schemeClr val="tx1"/>
-            </a:fontRef>
-          </p:style>
-        </p:cxnSp>
-        <p:cxnSp>
-          <p:nvCxnSpPr>
-            <p:cNvPr id="125" name="直線接點 124"/>
-            <p:cNvCxnSpPr/>
-            <p:nvPr/>
-          </p:nvCxnSpPr>
-          <p:spPr>
-            <a:xfrm flipH="1" flipV="1">
-              <a:off x="9489891" y="3440083"/>
-              <a:ext cx="410602" cy="883995"/>
-            </a:xfrm>
-            <a:prstGeom prst="line">
-              <a:avLst/>
-            </a:prstGeom>
-            <a:ln w="76200">
-              <a:solidFill>
-                <a:schemeClr val="tx1">
-                  <a:lumMod val="50000"/>
-                  <a:lumOff val="50000"/>
-                </a:schemeClr>
-              </a:solidFill>
-            </a:ln>
-          </p:spPr>
-          <p:style>
-            <a:lnRef idx="1">
-              <a:schemeClr val="accent1"/>
-            </a:lnRef>
-            <a:fillRef idx="0">
-              <a:schemeClr val="accent1"/>
-            </a:fillRef>
-            <a:effectRef idx="0">
-              <a:schemeClr val="accent1"/>
-            </a:effectRef>
-            <a:fontRef idx="minor">
-              <a:schemeClr val="tx1"/>
-            </a:fontRef>
-          </p:style>
-        </p:cxnSp>
-        <p:cxnSp>
-          <p:nvCxnSpPr>
-            <p:cNvPr id="126" name="直線接點 125"/>
-            <p:cNvCxnSpPr/>
-            <p:nvPr/>
-          </p:nvCxnSpPr>
-          <p:spPr>
-            <a:xfrm flipH="1">
-              <a:off x="9353223" y="4331258"/>
-              <a:ext cx="547270" cy="976423"/>
-            </a:xfrm>
-            <a:prstGeom prst="line">
-              <a:avLst/>
-            </a:prstGeom>
-            <a:ln w="76200">
-              <a:solidFill>
-                <a:schemeClr val="tx1">
-                  <a:lumMod val="50000"/>
-                  <a:lumOff val="50000"/>
-                </a:schemeClr>
-              </a:solidFill>
-            </a:ln>
-          </p:spPr>
-          <p:style>
-            <a:lnRef idx="1">
-              <a:schemeClr val="accent1"/>
-            </a:lnRef>
-            <a:fillRef idx="0">
-              <a:schemeClr val="accent1"/>
-            </a:fillRef>
-            <a:effectRef idx="0">
-              <a:schemeClr val="accent1"/>
-            </a:effectRef>
-            <a:fontRef idx="minor">
-              <a:schemeClr val="tx1"/>
-            </a:fontRef>
-          </p:style>
-        </p:cxnSp>
-        <p:cxnSp>
-          <p:nvCxnSpPr>
-            <p:cNvPr id="127" name="直線接點 126"/>
-            <p:cNvCxnSpPr/>
-            <p:nvPr/>
-          </p:nvCxnSpPr>
-          <p:spPr>
-            <a:xfrm>
-              <a:off x="8219916" y="796030"/>
-              <a:ext cx="0" cy="883995"/>
-            </a:xfrm>
-            <a:prstGeom prst="line">
-              <a:avLst/>
-            </a:prstGeom>
-            <a:ln w="76200">
-              <a:solidFill>
-                <a:schemeClr val="tx1">
-                  <a:lumMod val="50000"/>
-                  <a:lumOff val="50000"/>
-                </a:schemeClr>
-              </a:solidFill>
-            </a:ln>
-          </p:spPr>
-          <p:style>
-            <a:lnRef idx="1">
-              <a:schemeClr val="accent1"/>
-            </a:lnRef>
-            <a:fillRef idx="0">
-              <a:schemeClr val="accent1"/>
-            </a:fillRef>
-            <a:effectRef idx="0">
-              <a:schemeClr val="accent1"/>
-            </a:effectRef>
-            <a:fontRef idx="minor">
-              <a:schemeClr val="tx1"/>
-            </a:fontRef>
-          </p:style>
-        </p:cxnSp>
-        <p:sp>
-          <p:nvSpPr>
-            <p:cNvPr id="128" name="橢圓 127"/>
-            <p:cNvSpPr/>
-            <p:nvPr/>
-          </p:nvSpPr>
-          <p:spPr>
-            <a:xfrm>
-              <a:off x="7946581" y="528480"/>
-              <a:ext cx="546671" cy="535100"/>
-            </a:xfrm>
-            <a:prstGeom prst="ellipse">
-              <a:avLst/>
-            </a:prstGeom>
-            <a:solidFill>
-              <a:schemeClr val="tx1">
-                <a:lumMod val="75000"/>
-                <a:lumOff val="25000"/>
-              </a:schemeClr>
-            </a:solidFill>
-            <a:ln>
-              <a:noFill/>
-            </a:ln>
-            <a:effectLst/>
-          </p:spPr>
-          <p:style>
-            <a:lnRef idx="2">
-              <a:schemeClr val="accent1">
-                <a:shade val="50000"/>
-              </a:schemeClr>
-            </a:lnRef>
-            <a:fillRef idx="1">
-              <a:schemeClr val="accent1"/>
-            </a:fillRef>
-            <a:effectRef idx="0">
-              <a:schemeClr val="accent1"/>
-            </a:effectRef>
-            <a:fontRef idx="minor">
-              <a:schemeClr val="lt1"/>
-            </a:fontRef>
-          </p:style>
-          <p:txBody>
-            <a:bodyPr rtlCol="0" anchor="ctr"/>
-            <a:lstStyle/>
-            <a:p>
-              <a:pPr algn="ctr"/>
-              <a:r>
-                <a:rPr lang="en-US" altLang="zh-TW" sz="2400" dirty="0" smtClean="0">
-                  <a:latin typeface="Menlo" panose="020B0609030804020204" pitchFamily="49" charset="0"/>
-                  <a:cs typeface="Menlo" panose="020B0609030804020204" pitchFamily="49" charset="0"/>
-                </a:rPr>
-                <a:t>0</a:t>
-              </a:r>
-              <a:endParaRPr lang="zh-TW" altLang="en-US" sz="2400" dirty="0">
+              <a:endParaRPr lang="zh-TW" altLang="en-US" sz="1500" b="1" u="sng" dirty="0">
+                <a:solidFill>
+                  <a:srgbClr val="005FEA"/>
+                </a:solidFill>
                 <a:latin typeface="Menlo" panose="020B0609030804020204" pitchFamily="49" charset="0"/>
                 <a:cs typeface="Menlo" panose="020B0609030804020204" pitchFamily="49" charset="0"/>
               </a:endParaRPr>
@@ -12679,58 +12629,52 @@
         </p:sp>
         <p:sp>
           <p:nvSpPr>
-            <p:cNvPr id="129" name="橢圓 128"/>
-            <p:cNvSpPr/>
+            <p:cNvPr id="61" name="文字方塊 60"/>
+            <p:cNvSpPr txBox="1"/>
             <p:nvPr/>
           </p:nvSpPr>
           <p:spPr>
             <a:xfrm>
-              <a:off x="7946583" y="1412475"/>
-              <a:ext cx="546671" cy="535100"/>
+              <a:off x="4922728" y="4750806"/>
+              <a:ext cx="518719" cy="323165"/>
             </a:xfrm>
-            <a:prstGeom prst="ellipse">
+            <a:prstGeom prst="rect">
               <a:avLst/>
             </a:prstGeom>
-            <a:solidFill>
-              <a:schemeClr val="tx1">
-                <a:lumMod val="75000"/>
-                <a:lumOff val="25000"/>
-              </a:schemeClr>
-            </a:solidFill>
-            <a:ln>
-              <a:noFill/>
-            </a:ln>
-            <a:effectLst/>
+            <a:noFill/>
           </p:spPr>
-          <p:style>
-            <a:lnRef idx="2">
-              <a:schemeClr val="accent1">
-                <a:shade val="50000"/>
-              </a:schemeClr>
-            </a:lnRef>
-            <a:fillRef idx="1">
-              <a:schemeClr val="accent1"/>
-            </a:fillRef>
-            <a:effectRef idx="0">
-              <a:schemeClr val="accent1"/>
-            </a:effectRef>
-            <a:fontRef idx="minor">
-              <a:schemeClr val="lt1"/>
-            </a:fontRef>
-          </p:style>
           <p:txBody>
-            <a:bodyPr rtlCol="0" anchor="ctr"/>
+            <a:bodyPr wrap="square" rtlCol="0">
+              <a:spAutoFit/>
+            </a:bodyPr>
             <a:lstStyle/>
             <a:p>
-              <a:pPr algn="ctr"/>
               <a:r>
-                <a:rPr lang="en-US" altLang="zh-TW" sz="2400" dirty="0" smtClean="0">
+                <a:rPr lang="en-US" altLang="zh-TW" sz="1500" b="1" u="sng" dirty="0">
+                  <a:solidFill>
+                    <a:srgbClr val="005FEA"/>
+                  </a:solidFill>
                   <a:latin typeface="Menlo" panose="020B0609030804020204" pitchFamily="49" charset="0"/>
+                  <a:ea typeface="Menlo" panose="020B0609030804020204" pitchFamily="49" charset="0"/>
                   <a:cs typeface="Menlo" panose="020B0609030804020204" pitchFamily="49" charset="0"/>
                 </a:rPr>
                 <a:t>1</a:t>
               </a:r>
-              <a:endParaRPr lang="zh-TW" altLang="en-US" sz="2400" dirty="0">
+              <a:r>
+                <a:rPr lang="en-US" altLang="zh-TW" sz="1500" b="1" u="sng" dirty="0" smtClean="0">
+                  <a:solidFill>
+                    <a:srgbClr val="005FEA"/>
+                  </a:solidFill>
+                  <a:latin typeface="Menlo" panose="020B0609030804020204" pitchFamily="49" charset="0"/>
+                  <a:ea typeface="Menlo" panose="020B0609030804020204" pitchFamily="49" charset="0"/>
+                  <a:cs typeface="Menlo" panose="020B0609030804020204" pitchFamily="49" charset="0"/>
+                </a:rPr>
+                <a:t>0</a:t>
+              </a:r>
+              <a:endParaRPr lang="zh-TW" altLang="en-US" sz="1500" b="1" u="sng" dirty="0">
+                <a:solidFill>
+                  <a:srgbClr val="005FEA"/>
+                </a:solidFill>
                 <a:latin typeface="Menlo" panose="020B0609030804020204" pitchFamily="49" charset="0"/>
                 <a:cs typeface="Menlo" panose="020B0609030804020204" pitchFamily="49" charset="0"/>
               </a:endParaRPr>
@@ -12739,58 +12683,41 @@
         </p:sp>
         <p:sp>
           <p:nvSpPr>
-            <p:cNvPr id="130" name="橢圓 129"/>
-            <p:cNvSpPr/>
+            <p:cNvPr id="62" name="文字方塊 61"/>
+            <p:cNvSpPr txBox="1"/>
             <p:nvPr/>
           </p:nvSpPr>
           <p:spPr>
             <a:xfrm>
-              <a:off x="7251640" y="2298032"/>
-              <a:ext cx="546671" cy="535100"/>
+              <a:off x="5780656" y="4753006"/>
+              <a:ext cx="518719" cy="323165"/>
             </a:xfrm>
-            <a:prstGeom prst="ellipse">
+            <a:prstGeom prst="rect">
               <a:avLst/>
             </a:prstGeom>
-            <a:solidFill>
-              <a:schemeClr val="tx1">
-                <a:lumMod val="75000"/>
-                <a:lumOff val="25000"/>
-              </a:schemeClr>
-            </a:solidFill>
-            <a:ln>
-              <a:noFill/>
-            </a:ln>
-            <a:effectLst/>
+            <a:noFill/>
           </p:spPr>
-          <p:style>
-            <a:lnRef idx="2">
-              <a:schemeClr val="accent1">
-                <a:shade val="50000"/>
-              </a:schemeClr>
-            </a:lnRef>
-            <a:fillRef idx="1">
-              <a:schemeClr val="accent1"/>
-            </a:fillRef>
-            <a:effectRef idx="0">
-              <a:schemeClr val="accent1"/>
-            </a:effectRef>
-            <a:fontRef idx="minor">
-              <a:schemeClr val="lt1"/>
-            </a:fontRef>
-          </p:style>
           <p:txBody>
-            <a:bodyPr rtlCol="0" anchor="ctr"/>
+            <a:bodyPr wrap="square" rtlCol="0">
+              <a:spAutoFit/>
+            </a:bodyPr>
             <a:lstStyle/>
             <a:p>
-              <a:pPr algn="ctr"/>
               <a:r>
-                <a:rPr lang="en-US" altLang="zh-TW" sz="2400" dirty="0">
+                <a:rPr lang="en-US" altLang="zh-TW" sz="1500" b="1" u="sng" dirty="0" smtClean="0">
+                  <a:solidFill>
+                    <a:srgbClr val="158D05"/>
+                  </a:solidFill>
                   <a:latin typeface="Menlo" panose="020B0609030804020204" pitchFamily="49" charset="0"/>
+                  <a:ea typeface="Menlo" panose="020B0609030804020204" pitchFamily="49" charset="0"/>
                   <a:cs typeface="Menlo" panose="020B0609030804020204" pitchFamily="49" charset="0"/>
                 </a:rPr>
-                <a:t>9</a:t>
+                <a:t>13</a:t>
               </a:r>
-              <a:endParaRPr lang="zh-TW" altLang="en-US" sz="2400" dirty="0">
+              <a:endParaRPr lang="zh-TW" altLang="en-US" sz="1500" b="1" u="sng" dirty="0">
+                <a:solidFill>
+                  <a:srgbClr val="158D05"/>
+                </a:solidFill>
                 <a:latin typeface="Menlo" panose="020B0609030804020204" pitchFamily="49" charset="0"/>
                 <a:cs typeface="Menlo" panose="020B0609030804020204" pitchFamily="49" charset="0"/>
               </a:endParaRPr>
@@ -12799,58 +12726,41 @@
         </p:sp>
         <p:sp>
           <p:nvSpPr>
-            <p:cNvPr id="131" name="橢圓 130"/>
-            <p:cNvSpPr/>
+            <p:cNvPr id="63" name="文字方塊 62"/>
+            <p:cNvSpPr txBox="1"/>
             <p:nvPr/>
           </p:nvSpPr>
           <p:spPr>
             <a:xfrm>
-              <a:off x="8692727" y="2292504"/>
-              <a:ext cx="546671" cy="535100"/>
+              <a:off x="6046255" y="4493225"/>
+              <a:ext cx="518719" cy="323165"/>
             </a:xfrm>
-            <a:prstGeom prst="ellipse">
+            <a:prstGeom prst="rect">
               <a:avLst/>
             </a:prstGeom>
-            <a:solidFill>
-              <a:schemeClr val="tx1">
-                <a:lumMod val="75000"/>
-                <a:lumOff val="25000"/>
-              </a:schemeClr>
-            </a:solidFill>
-            <a:ln>
-              <a:noFill/>
-            </a:ln>
-            <a:effectLst/>
+            <a:noFill/>
           </p:spPr>
-          <p:style>
-            <a:lnRef idx="2">
-              <a:schemeClr val="accent1">
-                <a:shade val="50000"/>
-              </a:schemeClr>
-            </a:lnRef>
-            <a:fillRef idx="1">
-              <a:schemeClr val="accent1"/>
-            </a:fillRef>
-            <a:effectRef idx="0">
-              <a:schemeClr val="accent1"/>
-            </a:effectRef>
-            <a:fontRef idx="minor">
-              <a:schemeClr val="lt1"/>
-            </a:fontRef>
-          </p:style>
           <p:txBody>
-            <a:bodyPr rtlCol="0" anchor="ctr"/>
+            <a:bodyPr wrap="square" rtlCol="0">
+              <a:spAutoFit/>
+            </a:bodyPr>
             <a:lstStyle/>
             <a:p>
-              <a:pPr algn="ctr"/>
               <a:r>
-                <a:rPr lang="en-US" altLang="zh-TW" sz="2400" dirty="0" smtClean="0">
+                <a:rPr lang="en-US" altLang="zh-TW" sz="1500" b="1" u="sng" dirty="0" smtClean="0">
+                  <a:solidFill>
+                    <a:srgbClr val="005FEA"/>
+                  </a:solidFill>
                   <a:latin typeface="Menlo" panose="020B0609030804020204" pitchFamily="49" charset="0"/>
+                  <a:ea typeface="Menlo" panose="020B0609030804020204" pitchFamily="49" charset="0"/>
                   <a:cs typeface="Menlo" panose="020B0609030804020204" pitchFamily="49" charset="0"/>
                 </a:rPr>
-                <a:t>4</a:t>
+                <a:t>14</a:t>
               </a:r>
-              <a:endParaRPr lang="zh-TW" altLang="en-US" sz="2400" dirty="0">
+              <a:endParaRPr lang="zh-TW" altLang="en-US" sz="1500" b="1" u="sng" dirty="0">
+                <a:solidFill>
+                  <a:srgbClr val="005FEA"/>
+                </a:solidFill>
                 <a:latin typeface="Menlo" panose="020B0609030804020204" pitchFamily="49" charset="0"/>
                 <a:cs typeface="Menlo" panose="020B0609030804020204" pitchFamily="49" charset="0"/>
               </a:endParaRPr>
@@ -12859,58 +12769,41 @@
         </p:sp>
         <p:sp>
           <p:nvSpPr>
-            <p:cNvPr id="132" name="橢圓 131"/>
-            <p:cNvSpPr/>
+            <p:cNvPr id="64" name="文字方塊 63"/>
+            <p:cNvSpPr txBox="1"/>
             <p:nvPr/>
           </p:nvSpPr>
           <p:spPr>
             <a:xfrm>
-              <a:off x="9631347" y="4061462"/>
-              <a:ext cx="546671" cy="535100"/>
+              <a:off x="5467367" y="5739444"/>
+              <a:ext cx="518719" cy="323165"/>
             </a:xfrm>
-            <a:prstGeom prst="ellipse">
+            <a:prstGeom prst="rect">
               <a:avLst/>
             </a:prstGeom>
-            <a:solidFill>
-              <a:schemeClr val="tx1">
-                <a:lumMod val="75000"/>
-                <a:lumOff val="25000"/>
-              </a:schemeClr>
-            </a:solidFill>
-            <a:ln>
-              <a:noFill/>
-            </a:ln>
-            <a:effectLst/>
+            <a:noFill/>
           </p:spPr>
-          <p:style>
-            <a:lnRef idx="2">
-              <a:schemeClr val="accent1">
-                <a:shade val="50000"/>
-              </a:schemeClr>
-            </a:lnRef>
-            <a:fillRef idx="1">
-              <a:schemeClr val="accent1"/>
-            </a:fillRef>
-            <a:effectRef idx="0">
-              <a:schemeClr val="accent1"/>
-            </a:effectRef>
-            <a:fontRef idx="minor">
-              <a:schemeClr val="lt1"/>
-            </a:fontRef>
-          </p:style>
           <p:txBody>
-            <a:bodyPr rtlCol="0" anchor="ctr"/>
+            <a:bodyPr wrap="square" rtlCol="0">
+              <a:spAutoFit/>
+            </a:bodyPr>
             <a:lstStyle/>
             <a:p>
-              <a:pPr algn="ctr"/>
               <a:r>
-                <a:rPr lang="en-US" altLang="zh-TW" sz="2400" dirty="0" smtClean="0">
+                <a:rPr lang="en-US" altLang="zh-TW" sz="1500" b="1" u="sng" dirty="0" smtClean="0">
+                  <a:solidFill>
+                    <a:srgbClr val="005FEA"/>
+                  </a:solidFill>
                   <a:latin typeface="Menlo" panose="020B0609030804020204" pitchFamily="49" charset="0"/>
+                  <a:ea typeface="Menlo" panose="020B0609030804020204" pitchFamily="49" charset="0"/>
                   <a:cs typeface="Menlo" panose="020B0609030804020204" pitchFamily="49" charset="0"/>
                 </a:rPr>
-                <a:t>6</a:t>
+                <a:t>11</a:t>
               </a:r>
-              <a:endParaRPr lang="zh-TW" altLang="en-US" sz="2400" dirty="0">
+              <a:endParaRPr lang="zh-TW" altLang="en-US" sz="1500" b="1" u="sng" dirty="0">
+                <a:solidFill>
+                  <a:srgbClr val="005FEA"/>
+                </a:solidFill>
                 <a:latin typeface="Menlo" panose="020B0609030804020204" pitchFamily="49" charset="0"/>
                 <a:cs typeface="Menlo" panose="020B0609030804020204" pitchFamily="49" charset="0"/>
               </a:endParaRPr>
@@ -12919,58 +12812,41 @@
         </p:sp>
         <p:sp>
           <p:nvSpPr>
-            <p:cNvPr id="133" name="橢圓 132"/>
-            <p:cNvSpPr/>
+            <p:cNvPr id="66" name="文字方塊 65"/>
+            <p:cNvSpPr txBox="1"/>
             <p:nvPr/>
           </p:nvSpPr>
           <p:spPr>
             <a:xfrm>
-              <a:off x="9216557" y="3180033"/>
-              <a:ext cx="546671" cy="535100"/>
+              <a:off x="6349019" y="5740269"/>
+              <a:ext cx="518719" cy="323165"/>
             </a:xfrm>
-            <a:prstGeom prst="ellipse">
+            <a:prstGeom prst="rect">
               <a:avLst/>
             </a:prstGeom>
-            <a:solidFill>
-              <a:schemeClr val="tx1">
-                <a:lumMod val="75000"/>
-                <a:lumOff val="25000"/>
-              </a:schemeClr>
-            </a:solidFill>
-            <a:ln>
-              <a:noFill/>
-            </a:ln>
-            <a:effectLst/>
+            <a:noFill/>
           </p:spPr>
-          <p:style>
-            <a:lnRef idx="2">
-              <a:schemeClr val="accent1">
-                <a:shade val="50000"/>
-              </a:schemeClr>
-            </a:lnRef>
-            <a:fillRef idx="1">
-              <a:schemeClr val="accent1"/>
-            </a:fillRef>
-            <a:effectRef idx="0">
-              <a:schemeClr val="accent1"/>
-            </a:effectRef>
-            <a:fontRef idx="minor">
-              <a:schemeClr val="lt1"/>
-            </a:fontRef>
-          </p:style>
           <p:txBody>
-            <a:bodyPr rtlCol="0" anchor="ctr"/>
+            <a:bodyPr wrap="square" rtlCol="0">
+              <a:spAutoFit/>
+            </a:bodyPr>
             <a:lstStyle/>
             <a:p>
-              <a:pPr algn="ctr"/>
               <a:r>
-                <a:rPr lang="en-US" altLang="zh-TW" sz="2400" dirty="0" smtClean="0">
+                <a:rPr lang="en-US" altLang="zh-TW" sz="1500" b="1" u="sng" dirty="0" smtClean="0">
+                  <a:solidFill>
+                    <a:srgbClr val="158D05"/>
+                  </a:solidFill>
                   <a:latin typeface="Menlo" panose="020B0609030804020204" pitchFamily="49" charset="0"/>
+                  <a:ea typeface="Menlo" panose="020B0609030804020204" pitchFamily="49" charset="0"/>
                   <a:cs typeface="Menlo" panose="020B0609030804020204" pitchFamily="49" charset="0"/>
                 </a:rPr>
-                <a:t>5</a:t>
+                <a:t>12</a:t>
               </a:r>
-              <a:endParaRPr lang="zh-TW" altLang="en-US" sz="2400" dirty="0">
+              <a:endParaRPr lang="zh-TW" altLang="en-US" sz="1500" b="1" u="sng" dirty="0">
+                <a:solidFill>
+                  <a:srgbClr val="158D05"/>
+                </a:solidFill>
                 <a:latin typeface="Menlo" panose="020B0609030804020204" pitchFamily="49" charset="0"/>
                 <a:cs typeface="Menlo" panose="020B0609030804020204" pitchFamily="49" charset="0"/>
               </a:endParaRPr>
@@ -12979,58 +12855,41 @@
         </p:sp>
         <p:sp>
           <p:nvSpPr>
-            <p:cNvPr id="134" name="橢圓 133"/>
-            <p:cNvSpPr/>
+            <p:cNvPr id="67" name="文字方塊 66"/>
+            <p:cNvSpPr txBox="1"/>
             <p:nvPr/>
           </p:nvSpPr>
           <p:spPr>
             <a:xfrm>
-              <a:off x="8604011" y="4061462"/>
-              <a:ext cx="546671" cy="535100"/>
+              <a:off x="6885759" y="4493225"/>
+              <a:ext cx="518719" cy="323165"/>
             </a:xfrm>
-            <a:prstGeom prst="ellipse">
+            <a:prstGeom prst="rect">
               <a:avLst/>
             </a:prstGeom>
-            <a:solidFill>
-              <a:schemeClr val="tx1">
-                <a:lumMod val="75000"/>
-                <a:lumOff val="25000"/>
-              </a:schemeClr>
-            </a:solidFill>
-            <a:ln>
-              <a:noFill/>
-            </a:ln>
-            <a:effectLst/>
+            <a:noFill/>
           </p:spPr>
-          <p:style>
-            <a:lnRef idx="2">
-              <a:schemeClr val="accent1">
-                <a:shade val="50000"/>
-              </a:schemeClr>
-            </a:lnRef>
-            <a:fillRef idx="1">
-              <a:schemeClr val="accent1"/>
-            </a:fillRef>
-            <a:effectRef idx="0">
-              <a:schemeClr val="accent1"/>
-            </a:effectRef>
-            <a:fontRef idx="minor">
-              <a:schemeClr val="lt1"/>
-            </a:fontRef>
-          </p:style>
           <p:txBody>
-            <a:bodyPr rtlCol="0" anchor="ctr"/>
+            <a:bodyPr wrap="square" rtlCol="0">
+              <a:spAutoFit/>
+            </a:bodyPr>
             <a:lstStyle/>
             <a:p>
-              <a:pPr algn="ctr"/>
               <a:r>
-                <a:rPr lang="en-US" altLang="zh-TW" sz="2400" dirty="0">
+                <a:rPr lang="en-US" altLang="zh-TW" sz="1500" b="1" u="sng" dirty="0" smtClean="0">
+                  <a:solidFill>
+                    <a:srgbClr val="158D05"/>
+                  </a:solidFill>
                   <a:latin typeface="Menlo" panose="020B0609030804020204" pitchFamily="49" charset="0"/>
+                  <a:ea typeface="Menlo" panose="020B0609030804020204" pitchFamily="49" charset="0"/>
                   <a:cs typeface="Menlo" panose="020B0609030804020204" pitchFamily="49" charset="0"/>
                 </a:rPr>
-                <a:t>7</a:t>
+                <a:t>15</a:t>
               </a:r>
-              <a:endParaRPr lang="zh-TW" altLang="en-US" sz="2400" dirty="0">
+              <a:endParaRPr lang="zh-TW" altLang="en-US" sz="1500" b="1" u="sng" dirty="0">
+                <a:solidFill>
+                  <a:srgbClr val="158D05"/>
+                </a:solidFill>
                 <a:latin typeface="Menlo" panose="020B0609030804020204" pitchFamily="49" charset="0"/>
                 <a:cs typeface="Menlo" panose="020B0609030804020204" pitchFamily="49" charset="0"/>
               </a:endParaRPr>
@@ -13039,58 +12898,41 @@
         </p:sp>
         <p:sp>
           <p:nvSpPr>
-            <p:cNvPr id="135" name="橢圓 134"/>
-            <p:cNvSpPr/>
+            <p:cNvPr id="69" name="文字方塊 68"/>
+            <p:cNvSpPr txBox="1"/>
             <p:nvPr/>
           </p:nvSpPr>
           <p:spPr>
             <a:xfrm>
-              <a:off x="9084676" y="5040131"/>
-              <a:ext cx="546671" cy="535100"/>
+              <a:off x="6475047" y="3863858"/>
+              <a:ext cx="518719" cy="323165"/>
             </a:xfrm>
-            <a:prstGeom prst="ellipse">
+            <a:prstGeom prst="rect">
               <a:avLst/>
             </a:prstGeom>
-            <a:solidFill>
-              <a:schemeClr val="tx1">
-                <a:lumMod val="75000"/>
-                <a:lumOff val="25000"/>
-              </a:schemeClr>
-            </a:solidFill>
-            <a:ln>
-              <a:noFill/>
-            </a:ln>
-            <a:effectLst/>
+            <a:noFill/>
           </p:spPr>
-          <p:style>
-            <a:lnRef idx="2">
-              <a:schemeClr val="accent1">
-                <a:shade val="50000"/>
-              </a:schemeClr>
-            </a:lnRef>
-            <a:fillRef idx="1">
-              <a:schemeClr val="accent1"/>
-            </a:fillRef>
-            <a:effectRef idx="0">
-              <a:schemeClr val="accent1"/>
-            </a:effectRef>
-            <a:fontRef idx="minor">
-              <a:schemeClr val="lt1"/>
-            </a:fontRef>
-          </p:style>
           <p:txBody>
-            <a:bodyPr rtlCol="0" anchor="ctr"/>
+            <a:bodyPr wrap="square" rtlCol="0">
+              <a:spAutoFit/>
+            </a:bodyPr>
             <a:lstStyle/>
             <a:p>
-              <a:pPr algn="ctr"/>
               <a:r>
-                <a:rPr lang="en-US" altLang="zh-TW" sz="2400" dirty="0" smtClean="0">
+                <a:rPr lang="en-US" altLang="zh-TW" sz="1500" b="1" u="sng" dirty="0" smtClean="0">
+                  <a:solidFill>
+                    <a:srgbClr val="158D05"/>
+                  </a:solidFill>
                   <a:latin typeface="Menlo" panose="020B0609030804020204" pitchFamily="49" charset="0"/>
+                  <a:ea typeface="Menlo" panose="020B0609030804020204" pitchFamily="49" charset="0"/>
                   <a:cs typeface="Menlo" panose="020B0609030804020204" pitchFamily="49" charset="0"/>
                 </a:rPr>
-                <a:t>8</a:t>
+                <a:t>16</a:t>
               </a:r>
-              <a:endParaRPr lang="zh-TW" altLang="en-US" sz="2400" dirty="0">
+              <a:endParaRPr lang="zh-TW" altLang="en-US" sz="1500" b="1" u="sng" dirty="0">
+                <a:solidFill>
+                  <a:srgbClr val="158D05"/>
+                </a:solidFill>
                 <a:latin typeface="Menlo" panose="020B0609030804020204" pitchFamily="49" charset="0"/>
                 <a:cs typeface="Menlo" panose="020B0609030804020204" pitchFamily="49" charset="0"/>
               </a:endParaRPr>
@@ -13099,58 +12941,41 @@
         </p:sp>
         <p:sp>
           <p:nvSpPr>
-            <p:cNvPr id="136" name="橢圓 135"/>
-            <p:cNvSpPr/>
+            <p:cNvPr id="70" name="文字方塊 69"/>
+            <p:cNvSpPr txBox="1"/>
             <p:nvPr/>
           </p:nvSpPr>
           <p:spPr>
             <a:xfrm>
-              <a:off x="7415740" y="4061462"/>
-              <a:ext cx="546671" cy="535100"/>
+              <a:off x="5903584" y="2687034"/>
+              <a:ext cx="518719" cy="323165"/>
             </a:xfrm>
-            <a:prstGeom prst="ellipse">
+            <a:prstGeom prst="rect">
               <a:avLst/>
             </a:prstGeom>
-            <a:solidFill>
-              <a:schemeClr val="tx1">
-                <a:lumMod val="75000"/>
-                <a:lumOff val="25000"/>
-              </a:schemeClr>
-            </a:solidFill>
-            <a:ln>
-              <a:noFill/>
-            </a:ln>
-            <a:effectLst/>
+            <a:noFill/>
           </p:spPr>
-          <p:style>
-            <a:lnRef idx="2">
-              <a:schemeClr val="accent1">
-                <a:shade val="50000"/>
-              </a:schemeClr>
-            </a:lnRef>
-            <a:fillRef idx="1">
-              <a:schemeClr val="accent1"/>
-            </a:fillRef>
-            <a:effectRef idx="0">
-              <a:schemeClr val="accent1"/>
-            </a:effectRef>
-            <a:fontRef idx="minor">
-              <a:schemeClr val="lt1"/>
-            </a:fontRef>
-          </p:style>
           <p:txBody>
-            <a:bodyPr rtlCol="0" anchor="ctr"/>
+            <a:bodyPr wrap="square" rtlCol="0">
+              <a:spAutoFit/>
+            </a:bodyPr>
             <a:lstStyle/>
             <a:p>
-              <a:pPr algn="ctr"/>
               <a:r>
-                <a:rPr lang="en-US" altLang="zh-TW" sz="2400" dirty="0" smtClean="0">
+                <a:rPr lang="en-US" altLang="zh-TW" sz="1500" b="1" u="sng" dirty="0" smtClean="0">
+                  <a:solidFill>
+                    <a:srgbClr val="158D05"/>
+                  </a:solidFill>
                   <a:latin typeface="Menlo" panose="020B0609030804020204" pitchFamily="49" charset="0"/>
+                  <a:ea typeface="Menlo" panose="020B0609030804020204" pitchFamily="49" charset="0"/>
                   <a:cs typeface="Menlo" panose="020B0609030804020204" pitchFamily="49" charset="0"/>
                 </a:rPr>
-                <a:t>3</a:t>
+                <a:t>17</a:t>
               </a:r>
-              <a:endParaRPr lang="zh-TW" altLang="en-US" sz="2400" dirty="0">
+              <a:endParaRPr lang="zh-TW" altLang="en-US" sz="1500" b="1" u="sng" dirty="0">
+                <a:solidFill>
+                  <a:srgbClr val="158D05"/>
+                </a:solidFill>
                 <a:latin typeface="Menlo" panose="020B0609030804020204" pitchFamily="49" charset="0"/>
                 <a:cs typeface="Menlo" panose="020B0609030804020204" pitchFamily="49" charset="0"/>
               </a:endParaRPr>
@@ -13159,58 +12984,84 @@
         </p:sp>
         <p:sp>
           <p:nvSpPr>
-            <p:cNvPr id="137" name="橢圓 136"/>
-            <p:cNvSpPr/>
+            <p:cNvPr id="72" name="文字方塊 71"/>
+            <p:cNvSpPr txBox="1"/>
             <p:nvPr/>
           </p:nvSpPr>
           <p:spPr>
             <a:xfrm>
-              <a:off x="7838092" y="3165353"/>
-              <a:ext cx="546671" cy="535100"/>
+              <a:off x="5218753" y="2093789"/>
+              <a:ext cx="518719" cy="323165"/>
             </a:xfrm>
-            <a:prstGeom prst="ellipse">
+            <a:prstGeom prst="rect">
               <a:avLst/>
             </a:prstGeom>
-            <a:solidFill>
-              <a:schemeClr val="tx1">
-                <a:lumMod val="75000"/>
-                <a:lumOff val="25000"/>
-              </a:schemeClr>
-            </a:solidFill>
-            <a:ln>
-              <a:noFill/>
-            </a:ln>
-            <a:effectLst/>
+            <a:noFill/>
           </p:spPr>
-          <p:style>
-            <a:lnRef idx="2">
-              <a:schemeClr val="accent1">
-                <a:shade val="50000"/>
-              </a:schemeClr>
-            </a:lnRef>
-            <a:fillRef idx="1">
-              <a:schemeClr val="accent1"/>
-            </a:fillRef>
-            <a:effectRef idx="0">
-              <a:schemeClr val="accent1"/>
-            </a:effectRef>
-            <a:fontRef idx="minor">
-              <a:schemeClr val="lt1"/>
-            </a:fontRef>
-          </p:style>
           <p:txBody>
-            <a:bodyPr rtlCol="0" anchor="ctr"/>
+            <a:bodyPr wrap="square" rtlCol="0">
+              <a:spAutoFit/>
+            </a:bodyPr>
             <a:lstStyle/>
             <a:p>
-              <a:pPr algn="ctr"/>
               <a:r>
-                <a:rPr lang="en-US" altLang="zh-TW" sz="2400" dirty="0" smtClean="0">
+                <a:rPr lang="en-US" altLang="zh-TW" sz="1500" b="1" u="sng" dirty="0" smtClean="0">
+                  <a:solidFill>
+                    <a:srgbClr val="158D05"/>
+                  </a:solidFill>
                   <a:latin typeface="Menlo" panose="020B0609030804020204" pitchFamily="49" charset="0"/>
+                  <a:ea typeface="Menlo" panose="020B0609030804020204" pitchFamily="49" charset="0"/>
                   <a:cs typeface="Menlo" panose="020B0609030804020204" pitchFamily="49" charset="0"/>
                 </a:rPr>
-                <a:t>2</a:t>
+                <a:t>18</a:t>
               </a:r>
-              <a:endParaRPr lang="zh-TW" altLang="en-US" sz="2400" dirty="0">
+              <a:endParaRPr lang="zh-TW" altLang="en-US" sz="1500" b="1" u="sng" dirty="0">
+                <a:solidFill>
+                  <a:srgbClr val="158D05"/>
+                </a:solidFill>
+                <a:latin typeface="Menlo" panose="020B0609030804020204" pitchFamily="49" charset="0"/>
+                <a:cs typeface="Menlo" panose="020B0609030804020204" pitchFamily="49" charset="0"/>
+              </a:endParaRPr>
+            </a:p>
+          </p:txBody>
+        </p:sp>
+        <p:sp>
+          <p:nvSpPr>
+            <p:cNvPr id="73" name="文字方塊 72"/>
+            <p:cNvSpPr txBox="1"/>
+            <p:nvPr/>
+          </p:nvSpPr>
+          <p:spPr>
+            <a:xfrm>
+              <a:off x="5205079" y="1279209"/>
+              <a:ext cx="518719" cy="323165"/>
+            </a:xfrm>
+            <a:prstGeom prst="rect">
+              <a:avLst/>
+            </a:prstGeom>
+            <a:noFill/>
+          </p:spPr>
+          <p:txBody>
+            <a:bodyPr wrap="square" rtlCol="0">
+              <a:spAutoFit/>
+            </a:bodyPr>
+            <a:lstStyle/>
+            <a:p>
+              <a:r>
+                <a:rPr lang="en-US" altLang="zh-TW" sz="1500" b="1" u="sng" dirty="0" smtClean="0">
+                  <a:solidFill>
+                    <a:srgbClr val="158D05"/>
+                  </a:solidFill>
+                  <a:latin typeface="Menlo" panose="020B0609030804020204" pitchFamily="49" charset="0"/>
+                  <a:ea typeface="Menlo" panose="020B0609030804020204" pitchFamily="49" charset="0"/>
+                  <a:cs typeface="Menlo" panose="020B0609030804020204" pitchFamily="49" charset="0"/>
+                </a:rPr>
+                <a:t>19</a:t>
+              </a:r>
+              <a:endParaRPr lang="zh-TW" altLang="en-US" sz="1500" b="1" u="sng" dirty="0">
+                <a:solidFill>
+                  <a:srgbClr val="158D05"/>
+                </a:solidFill>
                 <a:latin typeface="Menlo" panose="020B0609030804020204" pitchFamily="49" charset="0"/>
                 <a:cs typeface="Menlo" panose="020B0609030804020204" pitchFamily="49" charset="0"/>
               </a:endParaRPr>

</xml_diff>

<commit_message>
Updated time stamp illustration
</commit_message>
<xml_diff>
--- a/Illustrations/illustrations.pptx
+++ b/Illustrations/illustrations.pptx
@@ -12212,12 +12212,12 @@
         </p:nvSpPr>
         <p:spPr>
           <a:xfrm rot="21390419">
-            <a:off x="5128820" y="2938581"/>
-            <a:ext cx="2265096" cy="2883147"/>
+            <a:off x="5139746" y="2881576"/>
+            <a:ext cx="2401887" cy="2983573"/>
           </a:xfrm>
           <a:prstGeom prst="arc">
             <a:avLst>
-              <a:gd name="adj1" fmla="val 15510603"/>
+              <a:gd name="adj1" fmla="val 15347787"/>
               <a:gd name="adj2" fmla="val 5398781"/>
             </a:avLst>
           </a:prstGeom>
@@ -12261,12 +12261,12 @@
         </p:nvSpPr>
         <p:spPr>
           <a:xfrm rot="20858719">
-            <a:off x="5176353" y="3068326"/>
-            <a:ext cx="1831832" cy="2083189"/>
+            <a:off x="5172876" y="3036200"/>
+            <a:ext cx="1831832" cy="2115692"/>
           </a:xfrm>
           <a:prstGeom prst="arc">
             <a:avLst>
-              <a:gd name="adj1" fmla="val 16489356"/>
+              <a:gd name="adj1" fmla="val 16388594"/>
               <a:gd name="adj2" fmla="val 3690667"/>
             </a:avLst>
           </a:prstGeom>
@@ -12310,13 +12310,13 @@
         </p:nvSpPr>
         <p:spPr>
           <a:xfrm rot="649815" flipH="1">
-            <a:off x="3672117" y="1309297"/>
-            <a:ext cx="2485613" cy="2612665"/>
+            <a:off x="3602771" y="1335042"/>
+            <a:ext cx="2551409" cy="2592023"/>
           </a:xfrm>
           <a:prstGeom prst="arc">
             <a:avLst>
               <a:gd name="adj1" fmla="val 16280781"/>
-              <a:gd name="adj2" fmla="val 5328389"/>
+              <a:gd name="adj2" fmla="val 5525388"/>
             </a:avLst>
           </a:prstGeom>
           <a:ln w="76200">
@@ -12400,7 +12400,7 @@
         <p:spPr>
           <a:xfrm>
             <a:off x="4974701" y="2227100"/>
-            <a:ext cx="763180" cy="844267"/>
+            <a:ext cx="712401" cy="854179"/>
           </a:xfrm>
           <a:prstGeom prst="line">
             <a:avLst/>
@@ -12439,8 +12439,8 @@
         </p:nvCxnSpPr>
         <p:spPr>
           <a:xfrm flipV="1">
-            <a:off x="4891792" y="3068087"/>
-            <a:ext cx="865633" cy="867584"/>
+            <a:off x="4891792" y="3060615"/>
+            <a:ext cx="795310" cy="875056"/>
           </a:xfrm>
           <a:prstGeom prst="line">
             <a:avLst/>
@@ -12472,13 +12472,15 @@
       <p:cxnSp>
         <p:nvCxnSpPr>
           <p:cNvPr id="122" name="直線接點 121"/>
-          <p:cNvCxnSpPr/>
+          <p:cNvCxnSpPr>
+            <a:cxnSpLocks/>
+          </p:cNvCxnSpPr>
           <p:nvPr/>
         </p:nvCxnSpPr>
         <p:spPr>
           <a:xfrm flipH="1" flipV="1">
-            <a:off x="5746427" y="3062821"/>
-            <a:ext cx="523830" cy="887529"/>
+            <a:off x="5687102" y="3059176"/>
+            <a:ext cx="583155" cy="891175"/>
           </a:xfrm>
           <a:prstGeom prst="line">
             <a:avLst/>
@@ -12548,13 +12550,15 @@
       <p:cxnSp>
         <p:nvCxnSpPr>
           <p:cNvPr id="125" name="直線接點 124"/>
-          <p:cNvCxnSpPr/>
+          <p:cNvCxnSpPr>
+            <a:cxnSpLocks/>
+          </p:cNvCxnSpPr>
           <p:nvPr/>
         </p:nvCxnSpPr>
         <p:spPr>
           <a:xfrm flipH="1" flipV="1">
-            <a:off x="6270256" y="3942850"/>
-            <a:ext cx="410602" cy="883995"/>
+            <a:off x="6270256" y="3942852"/>
+            <a:ext cx="518380" cy="986132"/>
           </a:xfrm>
           <a:prstGeom prst="line">
             <a:avLst/>
@@ -12586,13 +12590,15 @@
       <p:cxnSp>
         <p:nvCxnSpPr>
           <p:cNvPr id="126" name="直線接點 125"/>
-          <p:cNvCxnSpPr/>
+          <p:cNvCxnSpPr>
+            <a:cxnSpLocks/>
+          </p:cNvCxnSpPr>
           <p:nvPr/>
         </p:nvCxnSpPr>
         <p:spPr>
           <a:xfrm>
-            <a:off x="5568191" y="4825115"/>
-            <a:ext cx="565397" cy="985333"/>
+            <a:off x="5582225" y="4887381"/>
+            <a:ext cx="551363" cy="923067"/>
           </a:xfrm>
           <a:prstGeom prst="line">
             <a:avLst/>
@@ -12668,13 +12674,15 @@
               </a:ext>
             </a:extLst>
           </p:cNvPr>
-          <p:cNvCxnSpPr/>
+          <p:cNvCxnSpPr>
+            <a:cxnSpLocks/>
+          </p:cNvCxnSpPr>
           <p:nvPr/>
         </p:nvCxnSpPr>
         <p:spPr>
           <a:xfrm flipV="1">
-            <a:off x="5641601" y="3948116"/>
-            <a:ext cx="628654" cy="883995"/>
+            <a:off x="5590220" y="3948117"/>
+            <a:ext cx="680035" cy="955381"/>
           </a:xfrm>
           <a:prstGeom prst="line">
             <a:avLst/>
@@ -13089,7 +13097,7 @@
         </p:nvGrpSpPr>
         <p:grpSpPr>
           <a:xfrm>
-            <a:off x="5488718" y="2791891"/>
+            <a:off x="5407747" y="2791891"/>
             <a:ext cx="546671" cy="542736"/>
             <a:chOff x="2644061" y="765657"/>
             <a:chExt cx="546671" cy="542736"/>
@@ -13461,7 +13469,7 @@
         </p:nvGrpSpPr>
         <p:grpSpPr>
           <a:xfrm>
-            <a:off x="5370396" y="4622852"/>
+            <a:off x="5313240" y="4622852"/>
             <a:ext cx="546671" cy="542736"/>
             <a:chOff x="2644061" y="765657"/>
             <a:chExt cx="546671" cy="542736"/>
@@ -13703,7 +13711,7 @@
         </p:nvGrpSpPr>
         <p:grpSpPr>
           <a:xfrm>
-            <a:off x="6435109" y="4622359"/>
+            <a:off x="6492265" y="4622359"/>
             <a:ext cx="546671" cy="542736"/>
             <a:chOff x="2644061" y="765657"/>
             <a:chExt cx="546671" cy="542736"/>
@@ -14974,9 +14982,9 @@
         <p:grpSpPr>
           <a:xfrm>
             <a:off x="3695314" y="1326333"/>
-            <a:ext cx="2850051" cy="4880428"/>
+            <a:ext cx="2907207" cy="4941984"/>
             <a:chOff x="3774054" y="1345383"/>
-            <a:chExt cx="2850051" cy="4880428"/>
+            <a:chExt cx="2907207" cy="4941984"/>
           </a:xfrm>
         </p:grpSpPr>
         <p:sp>
@@ -14993,8 +15001,8 @@
           </p:nvSpPr>
           <p:spPr>
             <a:xfrm>
-              <a:off x="5668893" y="5887257"/>
-              <a:ext cx="434728" cy="338554"/>
+              <a:off x="5537236" y="5887257"/>
+              <a:ext cx="566385" cy="400110"/>
             </a:xfrm>
             <a:prstGeom prst="rect">
               <a:avLst/>
@@ -15009,7 +15017,7 @@
             <a:p>
               <a:pPr algn="r"/>
               <a:r>
-                <a:rPr lang="en-US" altLang="zh-TW" sz="1600" b="1" dirty="0">
+                <a:rPr lang="en-US" altLang="zh-TW" sz="2000" b="1" dirty="0">
                   <a:solidFill>
                     <a:srgbClr val="1565C0"/>
                   </a:solidFill>
@@ -15018,7 +15026,7 @@
                 </a:rPr>
                 <a:t>11</a:t>
               </a:r>
-              <a:endParaRPr lang="zh-TW" altLang="en-US" sz="1600" b="1" dirty="0">
+              <a:endParaRPr lang="zh-TW" altLang="en-US" sz="2000" b="1" dirty="0">
                 <a:solidFill>
                   <a:srgbClr val="1565C0"/>
                 </a:solidFill>
@@ -15043,7 +15051,7 @@
           <p:spPr>
             <a:xfrm>
               <a:off x="4473979" y="1345383"/>
-              <a:ext cx="434728" cy="338554"/>
+              <a:ext cx="434728" cy="400110"/>
             </a:xfrm>
             <a:prstGeom prst="rect">
               <a:avLst/>
@@ -15058,7 +15066,7 @@
             <a:p>
               <a:pPr algn="r"/>
               <a:r>
-                <a:rPr lang="en-US" altLang="zh-TW" sz="1600" b="1" dirty="0">
+                <a:rPr lang="en-US" altLang="zh-TW" sz="2000" b="1" dirty="0">
                   <a:solidFill>
                     <a:srgbClr val="1565C0"/>
                   </a:solidFill>
@@ -15067,7 +15075,7 @@
                 </a:rPr>
                 <a:t>0</a:t>
               </a:r>
-              <a:endParaRPr lang="zh-TW" altLang="en-US" sz="1600" b="1" dirty="0">
+              <a:endParaRPr lang="zh-TW" altLang="en-US" sz="2000" b="1" dirty="0">
                 <a:solidFill>
                   <a:srgbClr val="1565C0"/>
                 </a:solidFill>
@@ -15092,7 +15100,7 @@
           <p:spPr>
             <a:xfrm>
               <a:off x="3792541" y="3113312"/>
-              <a:ext cx="434728" cy="338554"/>
+              <a:ext cx="434728" cy="400110"/>
             </a:xfrm>
             <a:prstGeom prst="rect">
               <a:avLst/>
@@ -15107,7 +15115,7 @@
             <a:p>
               <a:pPr algn="r"/>
               <a:r>
-                <a:rPr lang="en-US" altLang="zh-TW" sz="1600" b="1" dirty="0">
+                <a:rPr lang="en-US" altLang="zh-TW" sz="2000" b="1" dirty="0">
                   <a:solidFill>
                     <a:srgbClr val="1565C0"/>
                   </a:solidFill>
@@ -15116,7 +15124,7 @@
                 </a:rPr>
                 <a:t>2</a:t>
               </a:r>
-              <a:endParaRPr lang="zh-TW" altLang="en-US" sz="1600" b="1" dirty="0">
+              <a:endParaRPr lang="zh-TW" altLang="en-US" sz="2000" b="1" dirty="0">
                 <a:solidFill>
                   <a:srgbClr val="1565C0"/>
                 </a:solidFill>
@@ -15140,8 +15148,8 @@
           </p:nvSpPr>
           <p:spPr>
             <a:xfrm>
-              <a:off x="5236636" y="3082005"/>
-              <a:ext cx="434728" cy="338554"/>
+              <a:off x="5155665" y="3082005"/>
+              <a:ext cx="434728" cy="400110"/>
             </a:xfrm>
             <a:prstGeom prst="rect">
               <a:avLst/>
@@ -15156,7 +15164,7 @@
             <a:p>
               <a:pPr algn="r"/>
               <a:r>
-                <a:rPr lang="en-US" altLang="zh-TW" sz="1600" b="1" dirty="0">
+                <a:rPr lang="en-US" altLang="zh-TW" sz="2000" b="1" dirty="0">
                   <a:solidFill>
                     <a:srgbClr val="1565C0"/>
                   </a:solidFill>
@@ -15165,7 +15173,7 @@
                 </a:rPr>
                 <a:t>4</a:t>
               </a:r>
-              <a:endParaRPr lang="zh-TW" altLang="en-US" sz="1600" b="1" dirty="0">
+              <a:endParaRPr lang="zh-TW" altLang="en-US" sz="2000" b="1" dirty="0">
                 <a:solidFill>
                   <a:srgbClr val="1565C0"/>
                 </a:solidFill>
@@ -15190,7 +15198,7 @@
           <p:spPr>
             <a:xfrm>
               <a:off x="4366997" y="3958658"/>
-              <a:ext cx="434728" cy="338554"/>
+              <a:ext cx="434728" cy="400110"/>
             </a:xfrm>
             <a:prstGeom prst="rect">
               <a:avLst/>
@@ -15205,7 +15213,7 @@
             <a:p>
               <a:pPr algn="r"/>
               <a:r>
-                <a:rPr lang="en-US" altLang="zh-TW" sz="1600" b="1" dirty="0">
+                <a:rPr lang="en-US" altLang="zh-TW" sz="2000" b="1" dirty="0">
                   <a:solidFill>
                     <a:srgbClr val="1565C0"/>
                   </a:solidFill>
@@ -15214,7 +15222,7 @@
                 </a:rPr>
                 <a:t>5</a:t>
               </a:r>
-              <a:endParaRPr lang="zh-TW" altLang="en-US" sz="1600" b="1" dirty="0">
+              <a:endParaRPr lang="zh-TW" altLang="en-US" sz="2000" b="1" dirty="0">
                 <a:solidFill>
                   <a:srgbClr val="1565C0"/>
                 </a:solidFill>
@@ -15239,7 +15247,7 @@
           <p:spPr>
             <a:xfrm>
               <a:off x="3774054" y="4909148"/>
-              <a:ext cx="434728" cy="338554"/>
+              <a:ext cx="434728" cy="400110"/>
             </a:xfrm>
             <a:prstGeom prst="rect">
               <a:avLst/>
@@ -15254,7 +15262,7 @@
             <a:p>
               <a:pPr algn="r"/>
               <a:r>
-                <a:rPr lang="en-US" altLang="zh-TW" sz="1600" b="1" dirty="0">
+                <a:rPr lang="en-US" altLang="zh-TW" sz="2000" b="1" dirty="0">
                   <a:solidFill>
                     <a:srgbClr val="1565C0"/>
                   </a:solidFill>
@@ -15263,7 +15271,7 @@
                 </a:rPr>
                 <a:t>6</a:t>
               </a:r>
-              <a:endParaRPr lang="zh-TW" altLang="en-US" sz="1600" b="1" dirty="0">
+              <a:endParaRPr lang="zh-TW" altLang="en-US" sz="2000" b="1" dirty="0">
                 <a:solidFill>
                   <a:srgbClr val="1565C0"/>
                 </a:solidFill>
@@ -15287,8 +15295,8 @@
           </p:nvSpPr>
           <p:spPr>
             <a:xfrm>
-              <a:off x="5124664" y="4912966"/>
-              <a:ext cx="434728" cy="338554"/>
+              <a:off x="4833126" y="4912966"/>
+              <a:ext cx="664347" cy="400110"/>
             </a:xfrm>
             <a:prstGeom prst="rect">
               <a:avLst/>
@@ -15303,7 +15311,7 @@
             <a:p>
               <a:pPr algn="r"/>
               <a:r>
-                <a:rPr lang="en-US" altLang="zh-TW" sz="1600" b="1" dirty="0">
+                <a:rPr lang="en-US" altLang="zh-TW" sz="2000" b="1" dirty="0">
                   <a:solidFill>
                     <a:srgbClr val="1565C0"/>
                   </a:solidFill>
@@ -15312,7 +15320,7 @@
                 </a:rPr>
                 <a:t>10</a:t>
               </a:r>
-              <a:endParaRPr lang="zh-TW" altLang="en-US" sz="1600" b="1" dirty="0">
+              <a:endParaRPr lang="zh-TW" altLang="en-US" sz="2000" b="1" dirty="0">
                 <a:solidFill>
                   <a:srgbClr val="1565C0"/>
                 </a:solidFill>
@@ -15337,7 +15345,7 @@
           <p:spPr>
             <a:xfrm>
               <a:off x="4470804" y="2238611"/>
-              <a:ext cx="434728" cy="338554"/>
+              <a:ext cx="434728" cy="400110"/>
             </a:xfrm>
             <a:prstGeom prst="rect">
               <a:avLst/>
@@ -15352,7 +15360,7 @@
             <a:p>
               <a:pPr algn="r"/>
               <a:r>
-                <a:rPr lang="en-US" altLang="zh-TW" sz="1600" b="1" dirty="0">
+                <a:rPr lang="en-US" altLang="zh-TW" sz="2000" b="1" dirty="0">
                   <a:solidFill>
                     <a:srgbClr val="1565C0"/>
                   </a:solidFill>
@@ -15361,7 +15369,7 @@
                 </a:rPr>
                 <a:t>1</a:t>
               </a:r>
-              <a:endParaRPr lang="zh-TW" altLang="en-US" sz="1600" b="1" dirty="0">
+              <a:endParaRPr lang="zh-TW" altLang="en-US" sz="2000" b="1" dirty="0">
                 <a:solidFill>
                   <a:srgbClr val="1565C0"/>
                 </a:solidFill>
@@ -15385,8 +15393,8 @@
           </p:nvSpPr>
           <p:spPr>
             <a:xfrm>
-              <a:off x="6189377" y="4912473"/>
-              <a:ext cx="434728" cy="338554"/>
+              <a:off x="6192541" y="4912473"/>
+              <a:ext cx="488720" cy="400110"/>
             </a:xfrm>
             <a:prstGeom prst="rect">
               <a:avLst/>
@@ -15401,7 +15409,7 @@
             <a:p>
               <a:pPr algn="r"/>
               <a:r>
-                <a:rPr lang="en-US" altLang="zh-TW" sz="1600" b="1" dirty="0">
+                <a:rPr lang="en-US" altLang="zh-TW" sz="2000" b="1" dirty="0">
                   <a:solidFill>
                     <a:srgbClr val="1565C0"/>
                   </a:solidFill>
@@ -15410,7 +15418,7 @@
                 </a:rPr>
                 <a:t>14</a:t>
               </a:r>
-              <a:endParaRPr lang="zh-TW" altLang="en-US" sz="1600" b="1" dirty="0">
+              <a:endParaRPr lang="zh-TW" altLang="en-US" sz="2000" b="1" dirty="0">
                 <a:solidFill>
                   <a:srgbClr val="1565C0"/>
                 </a:solidFill>
@@ -15435,7 +15443,7 @@
           <p:spPr>
             <a:xfrm>
               <a:off x="5754465" y="3961480"/>
-              <a:ext cx="434728" cy="338554"/>
+              <a:ext cx="434728" cy="400110"/>
             </a:xfrm>
             <a:prstGeom prst="rect">
               <a:avLst/>
@@ -15450,7 +15458,7 @@
             <a:p>
               <a:pPr algn="r"/>
               <a:r>
-                <a:rPr lang="en-US" altLang="zh-TW" sz="1600" b="1" dirty="0">
+                <a:rPr lang="en-US" altLang="zh-TW" sz="2000" b="1" dirty="0">
                   <a:solidFill>
                     <a:srgbClr val="1565C0"/>
                   </a:solidFill>
@@ -15459,7 +15467,7 @@
                 </a:rPr>
                 <a:t>9</a:t>
               </a:r>
-              <a:endParaRPr lang="zh-TW" altLang="en-US" sz="1600" b="1" dirty="0">
+              <a:endParaRPr lang="zh-TW" altLang="en-US" sz="2000" b="1" dirty="0">
                 <a:solidFill>
                   <a:srgbClr val="1565C0"/>
                 </a:solidFill>
@@ -15485,9 +15493,9 @@
         <p:grpSpPr>
           <a:xfrm>
             <a:off x="4463330" y="1326333"/>
-            <a:ext cx="2840526" cy="4880428"/>
+            <a:ext cx="2951674" cy="4941984"/>
             <a:chOff x="4385860" y="1345383"/>
-            <a:chExt cx="2840526" cy="4880428"/>
+            <a:chExt cx="2951674" cy="4941984"/>
           </a:xfrm>
         </p:grpSpPr>
         <p:sp>
@@ -15504,8 +15512,8 @@
           </p:nvSpPr>
           <p:spPr>
             <a:xfrm>
-              <a:off x="6271173" y="5887257"/>
-              <a:ext cx="434728" cy="338554"/>
+              <a:off x="6271172" y="5887257"/>
+              <a:ext cx="546671" cy="400110"/>
             </a:xfrm>
             <a:prstGeom prst="rect">
               <a:avLst/>
@@ -15519,7 +15527,7 @@
             <a:lstStyle/>
             <a:p>
               <a:r>
-                <a:rPr lang="en-US" altLang="zh-TW" sz="1600" b="1" dirty="0">
+                <a:rPr lang="en-US" altLang="zh-TW" sz="2000" b="1" dirty="0">
                   <a:solidFill>
                     <a:srgbClr val="388E3C"/>
                   </a:solidFill>
@@ -15528,7 +15536,7 @@
                 </a:rPr>
                 <a:t>12</a:t>
               </a:r>
-              <a:endParaRPr lang="zh-TW" altLang="en-US" sz="1600" b="1" dirty="0">
+              <a:endParaRPr lang="zh-TW" altLang="en-US" sz="2000" b="1" dirty="0">
                 <a:solidFill>
                   <a:srgbClr val="388E3C"/>
                 </a:solidFill>
@@ -15552,8 +15560,8 @@
           </p:nvSpPr>
           <p:spPr>
             <a:xfrm>
-              <a:off x="5082610" y="1345383"/>
-              <a:ext cx="434728" cy="338554"/>
+              <a:off x="5082609" y="1345383"/>
+              <a:ext cx="527023" cy="400110"/>
             </a:xfrm>
             <a:prstGeom prst="rect">
               <a:avLst/>
@@ -15567,7 +15575,7 @@
             <a:lstStyle/>
             <a:p>
               <a:r>
-                <a:rPr lang="en-US" altLang="zh-TW" sz="1600" b="1" dirty="0">
+                <a:rPr lang="en-US" altLang="zh-TW" sz="2000" b="1" dirty="0">
                   <a:solidFill>
                     <a:srgbClr val="388E3C"/>
                   </a:solidFill>
@@ -15576,7 +15584,7 @@
                 </a:rPr>
                 <a:t>19</a:t>
               </a:r>
-              <a:endParaRPr lang="zh-TW" altLang="en-US" sz="1600" b="1" dirty="0">
+              <a:endParaRPr lang="zh-TW" altLang="en-US" sz="2000" b="1" dirty="0">
                 <a:solidFill>
                   <a:srgbClr val="388E3C"/>
                 </a:solidFill>
@@ -15601,7 +15609,7 @@
           <p:spPr>
             <a:xfrm>
               <a:off x="4401172" y="3113312"/>
-              <a:ext cx="434728" cy="338554"/>
+              <a:ext cx="434728" cy="400110"/>
             </a:xfrm>
             <a:prstGeom prst="rect">
               <a:avLst/>
@@ -15615,7 +15623,7 @@
             <a:lstStyle/>
             <a:p>
               <a:r>
-                <a:rPr lang="en-US" altLang="zh-TW" sz="1600" b="1" dirty="0">
+                <a:rPr lang="en-US" altLang="zh-TW" sz="2000" b="1" dirty="0">
                   <a:solidFill>
                     <a:srgbClr val="388E3C"/>
                   </a:solidFill>
@@ -15624,7 +15632,7 @@
                 </a:rPr>
                 <a:t>3</a:t>
               </a:r>
-              <a:endParaRPr lang="zh-TW" altLang="en-US" sz="1600" b="1" dirty="0">
+              <a:endParaRPr lang="zh-TW" altLang="en-US" sz="2000" b="1" dirty="0">
                 <a:solidFill>
                   <a:srgbClr val="388E3C"/>
                 </a:solidFill>
@@ -15648,8 +15656,8 @@
           </p:nvSpPr>
           <p:spPr>
             <a:xfrm>
-              <a:off x="5842092" y="3082005"/>
-              <a:ext cx="434728" cy="338554"/>
+              <a:off x="5761121" y="3082005"/>
+              <a:ext cx="621006" cy="400110"/>
             </a:xfrm>
             <a:prstGeom prst="rect">
               <a:avLst/>
@@ -15663,7 +15671,7 @@
             <a:lstStyle/>
             <a:p>
               <a:r>
-                <a:rPr lang="en-US" altLang="zh-TW" sz="1600" b="1" dirty="0">
+                <a:rPr lang="en-US" altLang="zh-TW" sz="2000" b="1" dirty="0">
                   <a:solidFill>
                     <a:srgbClr val="388E3C"/>
                   </a:solidFill>
@@ -15672,7 +15680,7 @@
                 </a:rPr>
                 <a:t>17</a:t>
               </a:r>
-              <a:endParaRPr lang="zh-TW" altLang="en-US" sz="1600" b="1" dirty="0">
+              <a:endParaRPr lang="zh-TW" altLang="en-US" sz="2000" b="1" dirty="0">
                 <a:solidFill>
                   <a:srgbClr val="388E3C"/>
                 </a:solidFill>
@@ -15697,7 +15705,7 @@
           <p:spPr>
             <a:xfrm>
               <a:off x="4969278" y="3958658"/>
-              <a:ext cx="434728" cy="338554"/>
+              <a:ext cx="434728" cy="400110"/>
             </a:xfrm>
             <a:prstGeom prst="rect">
               <a:avLst/>
@@ -15711,7 +15719,7 @@
             <a:lstStyle/>
             <a:p>
               <a:r>
-                <a:rPr lang="en-US" altLang="zh-TW" sz="1600" b="1" dirty="0">
+                <a:rPr lang="en-US" altLang="zh-TW" sz="2000" b="1" dirty="0">
                   <a:solidFill>
                     <a:srgbClr val="388E3C"/>
                   </a:solidFill>
@@ -15720,7 +15728,7 @@
                 </a:rPr>
                 <a:t>8</a:t>
               </a:r>
-              <a:endParaRPr lang="zh-TW" altLang="en-US" sz="1600" b="1" dirty="0">
+              <a:endParaRPr lang="zh-TW" altLang="en-US" sz="2000" b="1" dirty="0">
                 <a:solidFill>
                   <a:srgbClr val="388E3C"/>
                 </a:solidFill>
@@ -15745,7 +15753,7 @@
           <p:spPr>
             <a:xfrm>
               <a:off x="4385860" y="4909148"/>
-              <a:ext cx="434728" cy="338554"/>
+              <a:ext cx="434728" cy="400110"/>
             </a:xfrm>
             <a:prstGeom prst="rect">
               <a:avLst/>
@@ -15759,7 +15767,7 @@
             <a:lstStyle/>
             <a:p>
               <a:r>
-                <a:rPr lang="en-US" altLang="zh-TW" sz="1600" b="1" dirty="0">
+                <a:rPr lang="en-US" altLang="zh-TW" sz="2000" b="1" dirty="0">
                   <a:solidFill>
                     <a:srgbClr val="388E3C"/>
                   </a:solidFill>
@@ -15768,7 +15776,7 @@
                 </a:rPr>
                 <a:t>7</a:t>
               </a:r>
-              <a:endParaRPr lang="zh-TW" altLang="en-US" sz="1600" b="1" dirty="0">
+              <a:endParaRPr lang="zh-TW" altLang="en-US" sz="2000" b="1" dirty="0">
                 <a:solidFill>
                   <a:srgbClr val="388E3C"/>
                 </a:solidFill>
@@ -15792,8 +15800,8 @@
           </p:nvSpPr>
           <p:spPr>
             <a:xfrm>
-              <a:off x="5726945" y="4912966"/>
-              <a:ext cx="434728" cy="338554"/>
+              <a:off x="5669789" y="4912966"/>
+              <a:ext cx="531962" cy="400110"/>
             </a:xfrm>
             <a:prstGeom prst="rect">
               <a:avLst/>
@@ -15807,7 +15815,7 @@
             <a:lstStyle/>
             <a:p>
               <a:r>
-                <a:rPr lang="en-US" altLang="zh-TW" sz="1600" b="1" dirty="0">
+                <a:rPr lang="en-US" altLang="zh-TW" sz="2000" b="1" dirty="0">
                   <a:solidFill>
                     <a:srgbClr val="388E3C"/>
                   </a:solidFill>
@@ -15816,7 +15824,7 @@
                 </a:rPr>
                 <a:t>13</a:t>
               </a:r>
-              <a:endParaRPr lang="zh-TW" altLang="en-US" sz="1600" b="1" dirty="0">
+              <a:endParaRPr lang="zh-TW" altLang="en-US" sz="2000" b="1" dirty="0">
                 <a:solidFill>
                   <a:srgbClr val="388E3C"/>
                 </a:solidFill>
@@ -15840,8 +15848,8 @@
           </p:nvSpPr>
           <p:spPr>
             <a:xfrm>
-              <a:off x="5076260" y="2238611"/>
-              <a:ext cx="434728" cy="338554"/>
+              <a:off x="5076259" y="2238611"/>
+              <a:ext cx="603695" cy="400110"/>
             </a:xfrm>
             <a:prstGeom prst="rect">
               <a:avLst/>
@@ -15855,7 +15863,7 @@
             <a:lstStyle/>
             <a:p>
               <a:r>
-                <a:rPr lang="en-US" altLang="zh-TW" sz="1600" b="1" dirty="0">
+                <a:rPr lang="en-US" altLang="zh-TW" sz="2000" b="1" dirty="0">
                   <a:solidFill>
                     <a:srgbClr val="388E3C"/>
                   </a:solidFill>
@@ -15864,7 +15872,7 @@
                 </a:rPr>
                 <a:t>18</a:t>
               </a:r>
-              <a:endParaRPr lang="zh-TW" altLang="en-US" sz="1600" b="1" dirty="0">
+              <a:endParaRPr lang="zh-TW" altLang="en-US" sz="2000" b="1" dirty="0">
                 <a:solidFill>
                   <a:srgbClr val="388E3C"/>
                 </a:solidFill>
@@ -15888,8 +15896,8 @@
           </p:nvSpPr>
           <p:spPr>
             <a:xfrm>
-              <a:off x="6791658" y="4912473"/>
-              <a:ext cx="434728" cy="338554"/>
+              <a:off x="6848814" y="4912473"/>
+              <a:ext cx="488720" cy="400110"/>
             </a:xfrm>
             <a:prstGeom prst="rect">
               <a:avLst/>
@@ -15903,7 +15911,7 @@
             <a:lstStyle/>
             <a:p>
               <a:r>
-                <a:rPr lang="en-US" altLang="zh-TW" sz="1600" b="1" dirty="0">
+                <a:rPr lang="en-US" altLang="zh-TW" sz="2000" b="1" dirty="0">
                   <a:solidFill>
                     <a:srgbClr val="388E3C"/>
                   </a:solidFill>
@@ -15912,7 +15920,7 @@
                 </a:rPr>
                 <a:t>15</a:t>
               </a:r>
-              <a:endParaRPr lang="zh-TW" altLang="en-US" sz="1600" b="1" dirty="0">
+              <a:endParaRPr lang="zh-TW" altLang="en-US" sz="2000" b="1" dirty="0">
                 <a:solidFill>
                   <a:srgbClr val="388E3C"/>
                 </a:solidFill>
@@ -15937,7 +15945,7 @@
           <p:spPr>
             <a:xfrm>
               <a:off x="6356746" y="3961480"/>
-              <a:ext cx="434728" cy="338554"/>
+              <a:ext cx="545346" cy="400110"/>
             </a:xfrm>
             <a:prstGeom prst="rect">
               <a:avLst/>
@@ -15951,7 +15959,7 @@
             <a:lstStyle/>
             <a:p>
               <a:r>
-                <a:rPr lang="en-US" altLang="zh-TW" sz="1600" b="1" dirty="0">
+                <a:rPr lang="en-US" altLang="zh-TW" sz="2000" b="1" dirty="0">
                   <a:solidFill>
                     <a:srgbClr val="388E3C"/>
                   </a:solidFill>
@@ -15960,7 +15968,7 @@
                 </a:rPr>
                 <a:t>16</a:t>
               </a:r>
-              <a:endParaRPr lang="zh-TW" altLang="en-US" sz="1600" b="1" dirty="0">
+              <a:endParaRPr lang="zh-TW" altLang="en-US" sz="2000" b="1" dirty="0">
                 <a:solidFill>
                   <a:srgbClr val="388E3C"/>
                 </a:solidFill>

</xml_diff>